<commit_message>
save before editing make_cv
</commit_message>
<xml_diff>
--- a/images/HP_Images.pptx
+++ b/images/HP_Images.pptx
@@ -262,7 +262,7 @@
           <a:p>
             <a:fld id="{FD2B4BCF-55E2-4653-B607-A4A4F08D7C21}" type="datetimeFigureOut">
               <a:rPr kumimoji="1" lang="ja-JP" altLang="en-US" smtClean="0"/>
-              <a:t>2024/3/10</a:t>
+              <a:t>2024/8/4</a:t>
             </a:fld>
             <a:endParaRPr kumimoji="1" lang="ja-JP" altLang="en-US"/>
           </a:p>
@@ -428,7 +428,7 @@
           <a:p>
             <a:fld id="{FDE72336-AA09-41ED-BEA9-7779C42A9B89}" type="datetimeFigureOut">
               <a:rPr kumimoji="1" lang="ja-JP" altLang="en-US" smtClean="0"/>
-              <a:t>2024/3/10</a:t>
+              <a:t>2024/8/4</a:t>
             </a:fld>
             <a:endParaRPr kumimoji="1" lang="ja-JP" altLang="en-US"/>
           </a:p>
@@ -967,7 +967,7 @@
           <a:p>
             <a:fld id="{D8ADE345-DDEA-4E47-B76C-5997699471F1}" type="datetime1">
               <a:rPr lang="ja-JP" altLang="en-US" smtClean="0"/>
-              <a:t>2024/3/10</a:t>
+              <a:t>2024/8/4</a:t>
             </a:fld>
             <a:endParaRPr lang="ja-JP" altLang="en-US"/>
           </a:p>
@@ -2061,7 +2061,7 @@
               <a:rPr kumimoji="1" lang="en-US" altLang="ja-JP" dirty="0">
                 <a:latin typeface="+mj-lt"/>
               </a:rPr>
-              <a:t>#033453</a:t>
+              <a:t>#042796</a:t>
             </a:r>
             <a:endParaRPr kumimoji="1" lang="ja-JP" altLang="en-US" dirty="0">
               <a:latin typeface="+mj-lt"/>
@@ -4347,8 +4347,8 @@
         </p:nvSpPr>
         <p:spPr>
           <a:xfrm>
-            <a:off x="-5059164" y="-1651797"/>
-            <a:ext cx="2376264" cy="1584176"/>
+            <a:off x="-8680958" y="-3405667"/>
+            <a:ext cx="1367928" cy="1584176"/>
           </a:xfrm>
           <a:prstGeom prst="rect">
             <a:avLst/>
@@ -4383,7 +4383,7 @@
             <a:pPr algn="ctr"/>
             <a:r>
               <a:rPr kumimoji="1" lang="en-US" altLang="ja-JP" dirty="0"/>
-              <a:t>0074E1</a:t>
+              <a:t>#0658DC</a:t>
             </a:r>
           </a:p>
         </p:txBody>
@@ -4402,7 +4402,7 @@
         </p:nvSpPr>
         <p:spPr>
           <a:xfrm>
-            <a:off x="-7573515" y="-868269"/>
+            <a:off x="-7313030" y="-311277"/>
             <a:ext cx="2376264" cy="1584176"/>
           </a:xfrm>
           <a:prstGeom prst="rect">
@@ -4446,62 +4446,6 @@
       </p:sp>
       <p:sp>
         <p:nvSpPr>
-          <p:cNvPr id="64" name="正方形/長方形 63">
-            <a:extLst>
-              <a:ext uri="{FF2B5EF4-FFF2-40B4-BE49-F238E27FC236}">
-                <a16:creationId xmlns:a16="http://schemas.microsoft.com/office/drawing/2014/main" id="{E8A33B27-B204-23DA-CE88-A3DC215FA572}"/>
-              </a:ext>
-            </a:extLst>
-          </p:cNvPr>
-          <p:cNvSpPr/>
-          <p:nvPr/>
-        </p:nvSpPr>
-        <p:spPr>
-          <a:xfrm>
-            <a:off x="-2939515" y="-3235973"/>
-            <a:ext cx="2376264" cy="1584176"/>
-          </a:xfrm>
-          <a:prstGeom prst="rect">
-            <a:avLst/>
-          </a:prstGeom>
-          <a:solidFill>
-            <a:srgbClr val="07889B"/>
-          </a:solidFill>
-          <a:ln>
-            <a:noFill/>
-          </a:ln>
-        </p:spPr>
-        <p:style>
-          <a:lnRef idx="2">
-            <a:schemeClr val="accent1">
-              <a:shade val="50000"/>
-            </a:schemeClr>
-          </a:lnRef>
-          <a:fillRef idx="1">
-            <a:schemeClr val="accent1"/>
-          </a:fillRef>
-          <a:effectRef idx="0">
-            <a:schemeClr val="accent1"/>
-          </a:effectRef>
-          <a:fontRef idx="minor">
-            <a:schemeClr val="lt1"/>
-          </a:fontRef>
-        </p:style>
-        <p:txBody>
-          <a:bodyPr rtlCol="0" anchor="ctr"/>
-          <a:lstStyle/>
-          <a:p>
-            <a:pPr algn="ctr"/>
-            <a:r>
-              <a:rPr kumimoji="1" lang="en-US" altLang="ja-JP" dirty="0"/>
-              <a:t>97889B</a:t>
-            </a:r>
-            <a:endParaRPr kumimoji="1" lang="ja-JP" altLang="en-US" dirty="0"/>
-          </a:p>
-        </p:txBody>
-      </p:sp>
-      <p:sp>
-        <p:nvSpPr>
           <p:cNvPr id="66" name="正方形/長方形 65">
             <a:extLst>
               <a:ext uri="{FF2B5EF4-FFF2-40B4-BE49-F238E27FC236}">
@@ -4514,7 +4458,7 @@
         </p:nvSpPr>
         <p:spPr>
           <a:xfrm>
-            <a:off x="-2946733" y="-1651797"/>
+            <a:off x="-3268883" y="-813766"/>
             <a:ext cx="2376264" cy="1584176"/>
           </a:xfrm>
           <a:prstGeom prst="rect">
@@ -4629,7 +4573,7 @@
         </p:nvSpPr>
         <p:spPr>
           <a:xfrm>
-            <a:off x="-8972482" y="-67621"/>
+            <a:off x="-10279673" y="982846"/>
             <a:ext cx="2376264" cy="1584176"/>
           </a:xfrm>
           <a:prstGeom prst="rect">
@@ -4684,7 +4628,7 @@
         </p:nvSpPr>
         <p:spPr>
           <a:xfrm>
-            <a:off x="-6725765" y="-4164958"/>
+            <a:off x="-839227" y="-3473955"/>
             <a:ext cx="2376264" cy="1584176"/>
           </a:xfrm>
           <a:prstGeom prst="rect">
@@ -4772,6 +4716,298 @@
           <a:p>
             <a:pPr algn="ctr"/>
             <a:endParaRPr kumimoji="1" lang="ja-JP" altLang="en-US"/>
+          </a:p>
+        </p:txBody>
+      </p:sp>
+      <p:sp>
+        <p:nvSpPr>
+          <p:cNvPr id="33" name="テキスト ボックス 32">
+            <a:extLst>
+              <a:ext uri="{FF2B5EF4-FFF2-40B4-BE49-F238E27FC236}">
+                <a16:creationId xmlns:a16="http://schemas.microsoft.com/office/drawing/2014/main" id="{EE3A17F1-C50A-0D75-18F1-1574D3CCC2EE}"/>
+              </a:ext>
+            </a:extLst>
+          </p:cNvPr>
+          <p:cNvSpPr txBox="1"/>
+          <p:nvPr/>
+        </p:nvSpPr>
+        <p:spPr>
+          <a:xfrm>
+            <a:off x="2785255" y="-1305690"/>
+            <a:ext cx="2807898" cy="369332"/>
+          </a:xfrm>
+          <a:prstGeom prst="rect">
+            <a:avLst/>
+          </a:prstGeom>
+          <a:solidFill>
+            <a:srgbClr val="C00000"/>
+          </a:solidFill>
+        </p:spPr>
+        <p:txBody>
+          <a:bodyPr wrap="square" rtlCol="0">
+            <a:spAutoFit/>
+          </a:bodyPr>
+          <a:lstStyle/>
+          <a:p>
+            <a:r>
+              <a:rPr kumimoji="1" lang="en-US" altLang="ja-JP" dirty="0">
+                <a:latin typeface="+mj-lt"/>
+              </a:rPr>
+              <a:t>#C00000</a:t>
+            </a:r>
+            <a:endParaRPr kumimoji="1" lang="ja-JP" altLang="en-US" dirty="0">
+              <a:latin typeface="+mj-lt"/>
+            </a:endParaRPr>
+          </a:p>
+        </p:txBody>
+      </p:sp>
+      <p:sp>
+        <p:nvSpPr>
+          <p:cNvPr id="49" name="テキスト ボックス 48">
+            <a:extLst>
+              <a:ext uri="{FF2B5EF4-FFF2-40B4-BE49-F238E27FC236}">
+                <a16:creationId xmlns:a16="http://schemas.microsoft.com/office/drawing/2014/main" id="{DF0CF94F-C52C-249A-D417-AA88581722B4}"/>
+              </a:ext>
+            </a:extLst>
+          </p:cNvPr>
+          <p:cNvSpPr txBox="1"/>
+          <p:nvPr/>
+        </p:nvSpPr>
+        <p:spPr>
+          <a:xfrm>
+            <a:off x="2781484" y="-1607728"/>
+            <a:ext cx="2807898" cy="369332"/>
+          </a:xfrm>
+          <a:prstGeom prst="rect">
+            <a:avLst/>
+          </a:prstGeom>
+          <a:solidFill>
+            <a:srgbClr val="042796"/>
+          </a:solidFill>
+        </p:spPr>
+        <p:txBody>
+          <a:bodyPr wrap="square" rtlCol="0">
+            <a:spAutoFit/>
+          </a:bodyPr>
+          <a:lstStyle/>
+          <a:p>
+            <a:r>
+              <a:rPr kumimoji="1" lang="en-US" altLang="ja-JP" dirty="0">
+                <a:latin typeface="+mj-lt"/>
+              </a:rPr>
+              <a:t>#042796</a:t>
+            </a:r>
+            <a:endParaRPr kumimoji="1" lang="ja-JP" altLang="en-US" dirty="0">
+              <a:latin typeface="+mj-lt"/>
+            </a:endParaRPr>
+          </a:p>
+        </p:txBody>
+      </p:sp>
+      <p:sp>
+        <p:nvSpPr>
+          <p:cNvPr id="50" name="テキスト ボックス 49">
+            <a:extLst>
+              <a:ext uri="{FF2B5EF4-FFF2-40B4-BE49-F238E27FC236}">
+                <a16:creationId xmlns:a16="http://schemas.microsoft.com/office/drawing/2014/main" id="{9DB62A1D-8906-91D5-2E2A-989CC3C4EA09}"/>
+              </a:ext>
+            </a:extLst>
+          </p:cNvPr>
+          <p:cNvSpPr txBox="1"/>
+          <p:nvPr/>
+        </p:nvSpPr>
+        <p:spPr>
+          <a:xfrm>
+            <a:off x="2781484" y="-936358"/>
+            <a:ext cx="2807898" cy="369332"/>
+          </a:xfrm>
+          <a:prstGeom prst="rect">
+            <a:avLst/>
+          </a:prstGeom>
+          <a:solidFill>
+            <a:srgbClr val="F48153"/>
+          </a:solidFill>
+        </p:spPr>
+        <p:txBody>
+          <a:bodyPr wrap="square" rtlCol="0">
+            <a:spAutoFit/>
+          </a:bodyPr>
+          <a:lstStyle/>
+          <a:p>
+            <a:r>
+              <a:rPr kumimoji="1" lang="en-US" altLang="ja-JP" dirty="0">
+                <a:latin typeface="+mj-lt"/>
+              </a:rPr>
+              <a:t>#F48153</a:t>
+            </a:r>
+            <a:endParaRPr kumimoji="1" lang="ja-JP" altLang="en-US" dirty="0">
+              <a:latin typeface="+mj-lt"/>
+            </a:endParaRPr>
+          </a:p>
+        </p:txBody>
+      </p:sp>
+      <p:sp>
+        <p:nvSpPr>
+          <p:cNvPr id="51" name="正方形/長方形 50">
+            <a:extLst>
+              <a:ext uri="{FF2B5EF4-FFF2-40B4-BE49-F238E27FC236}">
+                <a16:creationId xmlns:a16="http://schemas.microsoft.com/office/drawing/2014/main" id="{9D039E37-D449-8D64-5D0A-BF194346DC70}"/>
+              </a:ext>
+            </a:extLst>
+          </p:cNvPr>
+          <p:cNvSpPr/>
+          <p:nvPr/>
+        </p:nvSpPr>
+        <p:spPr>
+          <a:xfrm>
+            <a:off x="-7305812" y="-3405667"/>
+            <a:ext cx="1367928" cy="1584176"/>
+          </a:xfrm>
+          <a:prstGeom prst="rect">
+            <a:avLst/>
+          </a:prstGeom>
+          <a:solidFill>
+            <a:srgbClr val="D90DA4"/>
+          </a:solidFill>
+          <a:ln>
+            <a:noFill/>
+          </a:ln>
+        </p:spPr>
+        <p:style>
+          <a:lnRef idx="2">
+            <a:schemeClr val="accent1">
+              <a:shade val="50000"/>
+            </a:schemeClr>
+          </a:lnRef>
+          <a:fillRef idx="1">
+            <a:schemeClr val="accent1"/>
+          </a:fillRef>
+          <a:effectRef idx="0">
+            <a:schemeClr val="accent1"/>
+          </a:effectRef>
+          <a:fontRef idx="minor">
+            <a:schemeClr val="lt1"/>
+          </a:fontRef>
+        </p:style>
+        <p:txBody>
+          <a:bodyPr rtlCol="0" anchor="ctr"/>
+          <a:lstStyle/>
+          <a:p>
+            <a:pPr algn="ctr"/>
+            <a:r>
+              <a:rPr kumimoji="1" lang="en-US" altLang="ja-JP" dirty="0"/>
+              <a:t>#D90DA4</a:t>
+            </a:r>
+          </a:p>
+        </p:txBody>
+      </p:sp>
+      <p:sp>
+        <p:nvSpPr>
+          <p:cNvPr id="52" name="正方形/長方形 51">
+            <a:extLst>
+              <a:ext uri="{FF2B5EF4-FFF2-40B4-BE49-F238E27FC236}">
+                <a16:creationId xmlns:a16="http://schemas.microsoft.com/office/drawing/2014/main" id="{E8A33B27-B204-23DA-CE88-A3DC215FA572}"/>
+              </a:ext>
+            </a:extLst>
+          </p:cNvPr>
+          <p:cNvSpPr/>
+          <p:nvPr/>
+        </p:nvSpPr>
+        <p:spPr>
+          <a:xfrm>
+            <a:off x="-7885859" y="-1706325"/>
+            <a:ext cx="1106656" cy="1029545"/>
+          </a:xfrm>
+          <a:prstGeom prst="rect">
+            <a:avLst/>
+          </a:prstGeom>
+          <a:solidFill>
+            <a:srgbClr val="07889B"/>
+          </a:solidFill>
+          <a:ln>
+            <a:noFill/>
+          </a:ln>
+        </p:spPr>
+        <p:style>
+          <a:lnRef idx="2">
+            <a:schemeClr val="accent1">
+              <a:shade val="50000"/>
+            </a:schemeClr>
+          </a:lnRef>
+          <a:fillRef idx="1">
+            <a:schemeClr val="accent1"/>
+          </a:fillRef>
+          <a:effectRef idx="0">
+            <a:schemeClr val="accent1"/>
+          </a:effectRef>
+          <a:fontRef idx="minor">
+            <a:schemeClr val="lt1"/>
+          </a:fontRef>
+        </p:style>
+        <p:txBody>
+          <a:bodyPr rtlCol="0" anchor="ctr"/>
+          <a:lstStyle/>
+          <a:p>
+            <a:pPr algn="ctr"/>
+            <a:r>
+              <a:rPr kumimoji="1" lang="en-US" altLang="ja-JP" dirty="0"/>
+              <a:t>97889B</a:t>
+            </a:r>
+            <a:endParaRPr kumimoji="1" lang="ja-JP" altLang="en-US" dirty="0"/>
+          </a:p>
+        </p:txBody>
+      </p:sp>
+      <p:sp>
+        <p:nvSpPr>
+          <p:cNvPr id="79" name="正方形/長方形 78">
+            <a:extLst>
+              <a:ext uri="{FF2B5EF4-FFF2-40B4-BE49-F238E27FC236}">
+                <a16:creationId xmlns:a16="http://schemas.microsoft.com/office/drawing/2014/main" id="{1DC08C96-03A2-33AD-2FF6-AA7798BE7763}"/>
+              </a:ext>
+            </a:extLst>
+          </p:cNvPr>
+          <p:cNvSpPr/>
+          <p:nvPr/>
+        </p:nvSpPr>
+        <p:spPr>
+          <a:xfrm>
+            <a:off x="-5950682" y="-3405667"/>
+            <a:ext cx="1367928" cy="1584176"/>
+          </a:xfrm>
+          <a:prstGeom prst="rect">
+            <a:avLst/>
+          </a:prstGeom>
+          <a:solidFill>
+            <a:srgbClr val="C00000"/>
+          </a:solidFill>
+          <a:ln>
+            <a:noFill/>
+          </a:ln>
+        </p:spPr>
+        <p:style>
+          <a:lnRef idx="2">
+            <a:schemeClr val="accent1">
+              <a:shade val="50000"/>
+            </a:schemeClr>
+          </a:lnRef>
+          <a:fillRef idx="1">
+            <a:schemeClr val="accent1"/>
+          </a:fillRef>
+          <a:effectRef idx="0">
+            <a:schemeClr val="accent1"/>
+          </a:effectRef>
+          <a:fontRef idx="minor">
+            <a:schemeClr val="lt1"/>
+          </a:fontRef>
+        </p:style>
+        <p:txBody>
+          <a:bodyPr rtlCol="0" anchor="ctr"/>
+          <a:lstStyle/>
+          <a:p>
+            <a:pPr algn="ctr"/>
+            <a:r>
+              <a:rPr kumimoji="1" lang="en-US" altLang="ja-JP" dirty="0"/>
+              <a:t>#C000000</a:t>
+            </a:r>
           </a:p>
         </p:txBody>
       </p:sp>

</xml_diff>

<commit_message>
cleaned css a bit but still working on  mobile navbar
</commit_message>
<xml_diff>
--- a/images/HP_Images.pptx
+++ b/images/HP_Images.pptx
@@ -262,7 +262,7 @@
           <a:p>
             <a:fld id="{FD2B4BCF-55E2-4653-B607-A4A4F08D7C21}" type="datetimeFigureOut">
               <a:rPr kumimoji="1" lang="ja-JP" altLang="en-US" smtClean="0"/>
-              <a:t>2024/8/21</a:t>
+              <a:t>2025/1/4</a:t>
             </a:fld>
             <a:endParaRPr kumimoji="1" lang="ja-JP" altLang="en-US"/>
           </a:p>
@@ -428,7 +428,7 @@
           <a:p>
             <a:fld id="{FDE72336-AA09-41ED-BEA9-7779C42A9B89}" type="datetimeFigureOut">
               <a:rPr kumimoji="1" lang="ja-JP" altLang="en-US" smtClean="0"/>
-              <a:t>2024/8/21</a:t>
+              <a:t>2025/1/4</a:t>
             </a:fld>
             <a:endParaRPr kumimoji="1" lang="ja-JP" altLang="en-US"/>
           </a:p>
@@ -967,7 +967,7 @@
           <a:p>
             <a:fld id="{D8ADE345-DDEA-4E47-B76C-5997699471F1}" type="datetime1">
               <a:rPr lang="ja-JP" altLang="en-US" smtClean="0"/>
-              <a:t>2024/8/21</a:t>
+              <a:t>2025/1/4</a:t>
             </a:fld>
             <a:endParaRPr lang="ja-JP" altLang="en-US"/>
           </a:p>
@@ -27191,10 +27191,10 @@
       </p:grpSpPr>
       <p:grpSp>
         <p:nvGrpSpPr>
-          <p:cNvPr id="19" name="グループ化 18">
+          <p:cNvPr id="2" name="グループ化 1">
             <a:extLst>
               <a:ext uri="{FF2B5EF4-FFF2-40B4-BE49-F238E27FC236}">
-                <a16:creationId xmlns:a16="http://schemas.microsoft.com/office/drawing/2014/main" id="{FE7D523B-162F-FFED-A5EC-1B524441499C}"/>
+                <a16:creationId xmlns:a16="http://schemas.microsoft.com/office/drawing/2014/main" id="{45CBF709-74BB-17CD-4F35-F3545102B105}"/>
               </a:ext>
             </a:extLst>
           </p:cNvPr>
@@ -27203,714 +27203,2097 @@
         </p:nvGrpSpPr>
         <p:grpSpPr>
           <a:xfrm>
-            <a:off x="4439816" y="1196752"/>
-            <a:ext cx="2055320" cy="2370455"/>
-            <a:chOff x="4439816" y="1196752"/>
-            <a:chExt cx="2055320" cy="2370455"/>
+            <a:off x="3548309" y="1746752"/>
+            <a:ext cx="1102029" cy="1270457"/>
+            <a:chOff x="5724741" y="3705189"/>
+            <a:chExt cx="1248420" cy="1439223"/>
           </a:xfrm>
         </p:grpSpPr>
-        <p:grpSp>
-          <p:nvGrpSpPr>
-            <p:cNvPr id="2" name="グループ化 1">
+        <p:cxnSp>
+          <p:nvCxnSpPr>
+            <p:cNvPr id="3" name="直線矢印コネクタ 2">
               <a:extLst>
                 <a:ext uri="{FF2B5EF4-FFF2-40B4-BE49-F238E27FC236}">
-                  <a16:creationId xmlns:a16="http://schemas.microsoft.com/office/drawing/2014/main" id="{45CBF709-74BB-17CD-4F35-F3545102B105}"/>
+                  <a16:creationId xmlns:a16="http://schemas.microsoft.com/office/drawing/2014/main" id="{271899CE-CFA8-5315-8E62-E86D46959EF2}"/>
                 </a:ext>
               </a:extLst>
             </p:cNvPr>
-            <p:cNvGrpSpPr/>
+            <p:cNvCxnSpPr>
+              <a:cxnSpLocks/>
+            </p:cNvCxnSpPr>
             <p:nvPr/>
-          </p:nvGrpSpPr>
-          <p:grpSpPr>
+          </p:nvCxnSpPr>
+          <p:spPr>
             <a:xfrm>
-              <a:off x="4916461" y="1746752"/>
-              <a:ext cx="1102029" cy="1270457"/>
-              <a:chOff x="5724741" y="3705189"/>
-              <a:chExt cx="1248420" cy="1439223"/>
+              <a:off x="6350361" y="3705189"/>
+              <a:ext cx="622800" cy="360000"/>
             </a:xfrm>
-          </p:grpSpPr>
-          <p:cxnSp>
-            <p:nvCxnSpPr>
-              <p:cNvPr id="3" name="直線矢印コネクタ 2">
-                <a:extLst>
-                  <a:ext uri="{FF2B5EF4-FFF2-40B4-BE49-F238E27FC236}">
-                    <a16:creationId xmlns:a16="http://schemas.microsoft.com/office/drawing/2014/main" id="{271899CE-CFA8-5315-8E62-E86D46959EF2}"/>
-                  </a:ext>
-                </a:extLst>
-              </p:cNvPr>
-              <p:cNvCxnSpPr>
-                <a:cxnSpLocks/>
-              </p:cNvCxnSpPr>
-              <p:nvPr/>
-            </p:nvCxnSpPr>
-            <p:spPr>
-              <a:xfrm>
-                <a:off x="6350361" y="3705189"/>
-                <a:ext cx="622800" cy="360000"/>
-              </a:xfrm>
-              <a:prstGeom prst="straightConnector1">
-                <a:avLst/>
-              </a:prstGeom>
-              <a:ln w="38100">
-                <a:solidFill>
-                  <a:srgbClr val="376C8A"/>
-                </a:solidFill>
-                <a:tailEnd type="triangle"/>
-              </a:ln>
-            </p:spPr>
-            <p:style>
-              <a:lnRef idx="1">
-                <a:schemeClr val="accent1"/>
-              </a:lnRef>
-              <a:fillRef idx="0">
-                <a:schemeClr val="accent1"/>
-              </a:fillRef>
-              <a:effectRef idx="0">
-                <a:schemeClr val="accent1"/>
-              </a:effectRef>
-              <a:fontRef idx="minor">
-                <a:schemeClr val="tx1"/>
-              </a:fontRef>
-            </p:style>
-          </p:cxnSp>
-          <p:cxnSp>
-            <p:nvCxnSpPr>
-              <p:cNvPr id="4" name="直線矢印コネクタ 3">
-                <a:extLst>
-                  <a:ext uri="{FF2B5EF4-FFF2-40B4-BE49-F238E27FC236}">
-                    <a16:creationId xmlns:a16="http://schemas.microsoft.com/office/drawing/2014/main" id="{162A879C-FF3F-382B-02CD-2AF8E258A563}"/>
-                  </a:ext>
-                </a:extLst>
-              </p:cNvPr>
-              <p:cNvCxnSpPr>
-                <a:cxnSpLocks/>
-              </p:cNvCxnSpPr>
-              <p:nvPr/>
-            </p:nvCxnSpPr>
-            <p:spPr>
-              <a:xfrm>
-                <a:off x="6972968" y="4064412"/>
-                <a:ext cx="0" cy="720000"/>
-              </a:xfrm>
-              <a:prstGeom prst="straightConnector1">
-                <a:avLst/>
-              </a:prstGeom>
-              <a:ln w="38100">
-                <a:solidFill>
-                  <a:srgbClr val="376C8A"/>
-                </a:solidFill>
-                <a:tailEnd type="triangle"/>
-              </a:ln>
-            </p:spPr>
-            <p:style>
-              <a:lnRef idx="1">
-                <a:schemeClr val="accent1"/>
-              </a:lnRef>
-              <a:fillRef idx="0">
-                <a:schemeClr val="accent1"/>
-              </a:fillRef>
-              <a:effectRef idx="0">
-                <a:schemeClr val="accent1"/>
-              </a:effectRef>
-              <a:fontRef idx="minor">
-                <a:schemeClr val="tx1"/>
-              </a:fontRef>
-            </p:style>
-          </p:cxnSp>
-          <p:cxnSp>
-            <p:nvCxnSpPr>
-              <p:cNvPr id="5" name="直線矢印コネクタ 4">
-                <a:extLst>
-                  <a:ext uri="{FF2B5EF4-FFF2-40B4-BE49-F238E27FC236}">
-                    <a16:creationId xmlns:a16="http://schemas.microsoft.com/office/drawing/2014/main" id="{DA7EB8FF-E107-E265-C819-10E4691B1F9E}"/>
-                  </a:ext>
-                </a:extLst>
-              </p:cNvPr>
-              <p:cNvCxnSpPr>
-                <a:cxnSpLocks/>
-              </p:cNvCxnSpPr>
-              <p:nvPr/>
-            </p:nvCxnSpPr>
-            <p:spPr>
-              <a:xfrm flipH="1">
-                <a:off x="6350361" y="4784412"/>
-                <a:ext cx="622800" cy="360000"/>
-              </a:xfrm>
-              <a:prstGeom prst="straightConnector1">
-                <a:avLst/>
-              </a:prstGeom>
-              <a:ln w="38100">
-                <a:solidFill>
-                  <a:srgbClr val="376C8A"/>
-                </a:solidFill>
-                <a:tailEnd type="triangle"/>
-              </a:ln>
-            </p:spPr>
-            <p:style>
-              <a:lnRef idx="1">
-                <a:schemeClr val="accent1"/>
-              </a:lnRef>
-              <a:fillRef idx="0">
-                <a:schemeClr val="accent1"/>
-              </a:fillRef>
-              <a:effectRef idx="0">
-                <a:schemeClr val="accent1"/>
-              </a:effectRef>
-              <a:fontRef idx="minor">
-                <a:schemeClr val="tx1"/>
-              </a:fontRef>
-            </p:style>
-          </p:cxnSp>
-          <p:cxnSp>
-            <p:nvCxnSpPr>
-              <p:cNvPr id="6" name="直線矢印コネクタ 5">
-                <a:extLst>
-                  <a:ext uri="{FF2B5EF4-FFF2-40B4-BE49-F238E27FC236}">
-                    <a16:creationId xmlns:a16="http://schemas.microsoft.com/office/drawing/2014/main" id="{076EA254-4445-E77A-35FC-B486FA165896}"/>
-                  </a:ext>
-                </a:extLst>
-              </p:cNvPr>
-              <p:cNvCxnSpPr>
-                <a:cxnSpLocks/>
-              </p:cNvCxnSpPr>
-              <p:nvPr/>
-            </p:nvCxnSpPr>
-            <p:spPr>
-              <a:xfrm flipH="1" flipV="1">
-                <a:off x="5727561" y="4784412"/>
-                <a:ext cx="622800" cy="360000"/>
-              </a:xfrm>
-              <a:prstGeom prst="straightConnector1">
-                <a:avLst/>
-              </a:prstGeom>
-              <a:ln w="38100">
-                <a:solidFill>
-                  <a:srgbClr val="376C8A"/>
-                </a:solidFill>
-                <a:tailEnd type="triangle"/>
-              </a:ln>
-            </p:spPr>
-            <p:style>
-              <a:lnRef idx="1">
-                <a:schemeClr val="accent1"/>
-              </a:lnRef>
-              <a:fillRef idx="0">
-                <a:schemeClr val="accent1"/>
-              </a:fillRef>
-              <a:effectRef idx="0">
-                <a:schemeClr val="accent1"/>
-              </a:effectRef>
-              <a:fontRef idx="minor">
-                <a:schemeClr val="tx1"/>
-              </a:fontRef>
-            </p:style>
-          </p:cxnSp>
-          <p:cxnSp>
-            <p:nvCxnSpPr>
-              <p:cNvPr id="7" name="直線矢印コネクタ 6">
-                <a:extLst>
-                  <a:ext uri="{FF2B5EF4-FFF2-40B4-BE49-F238E27FC236}">
-                    <a16:creationId xmlns:a16="http://schemas.microsoft.com/office/drawing/2014/main" id="{677D3DB2-551C-A797-CB78-D710B47673B2}"/>
-                  </a:ext>
-                </a:extLst>
-              </p:cNvPr>
-              <p:cNvCxnSpPr>
-                <a:cxnSpLocks/>
-              </p:cNvCxnSpPr>
-              <p:nvPr/>
-            </p:nvCxnSpPr>
-            <p:spPr>
-              <a:xfrm flipV="1">
-                <a:off x="5724741" y="4064412"/>
-                <a:ext cx="0" cy="720000"/>
-              </a:xfrm>
-              <a:prstGeom prst="straightConnector1">
-                <a:avLst/>
-              </a:prstGeom>
-              <a:ln w="38100">
-                <a:solidFill>
-                  <a:srgbClr val="376C8A"/>
-                </a:solidFill>
-                <a:tailEnd type="triangle"/>
-              </a:ln>
-            </p:spPr>
-            <p:style>
-              <a:lnRef idx="1">
-                <a:schemeClr val="accent1"/>
-              </a:lnRef>
-              <a:fillRef idx="0">
-                <a:schemeClr val="accent1"/>
-              </a:fillRef>
-              <a:effectRef idx="0">
-                <a:schemeClr val="accent1"/>
-              </a:effectRef>
-              <a:fontRef idx="minor">
-                <a:schemeClr val="tx1"/>
-              </a:fontRef>
-            </p:style>
-          </p:cxnSp>
-          <p:cxnSp>
-            <p:nvCxnSpPr>
-              <p:cNvPr id="8" name="直線矢印コネクタ 7">
-                <a:extLst>
-                  <a:ext uri="{FF2B5EF4-FFF2-40B4-BE49-F238E27FC236}">
-                    <a16:creationId xmlns:a16="http://schemas.microsoft.com/office/drawing/2014/main" id="{24C3E8C4-8FB0-DAE9-7A3A-BD45DF3AB916}"/>
-                  </a:ext>
-                </a:extLst>
-              </p:cNvPr>
-              <p:cNvCxnSpPr>
-                <a:cxnSpLocks/>
-              </p:cNvCxnSpPr>
-              <p:nvPr/>
-            </p:nvCxnSpPr>
-            <p:spPr>
-              <a:xfrm flipV="1">
-                <a:off x="5727561" y="3705189"/>
-                <a:ext cx="622800" cy="360000"/>
-              </a:xfrm>
-              <a:prstGeom prst="straightConnector1">
-                <a:avLst/>
-              </a:prstGeom>
-              <a:ln w="38100">
-                <a:solidFill>
-                  <a:srgbClr val="376C8A"/>
-                </a:solidFill>
-                <a:tailEnd type="triangle"/>
-              </a:ln>
-            </p:spPr>
-            <p:style>
-              <a:lnRef idx="1">
-                <a:schemeClr val="accent1"/>
-              </a:lnRef>
-              <a:fillRef idx="0">
-                <a:schemeClr val="accent1"/>
-              </a:fillRef>
-              <a:effectRef idx="0">
-                <a:schemeClr val="accent1"/>
-              </a:effectRef>
-              <a:fontRef idx="minor">
-                <a:schemeClr val="tx1"/>
-              </a:fontRef>
-            </p:style>
-          </p:cxnSp>
-          <p:cxnSp>
-            <p:nvCxnSpPr>
-              <p:cNvPr id="9" name="直線矢印コネクタ 8">
-                <a:extLst>
-                  <a:ext uri="{FF2B5EF4-FFF2-40B4-BE49-F238E27FC236}">
-                    <a16:creationId xmlns:a16="http://schemas.microsoft.com/office/drawing/2014/main" id="{3D15182A-1AB4-CAD4-9101-68FA82958F00}"/>
-                  </a:ext>
-                </a:extLst>
-              </p:cNvPr>
-              <p:cNvCxnSpPr>
-                <a:cxnSpLocks/>
-              </p:cNvCxnSpPr>
-              <p:nvPr/>
-            </p:nvCxnSpPr>
-            <p:spPr>
-              <a:xfrm flipV="1">
-                <a:off x="6884844" y="4064412"/>
-                <a:ext cx="0" cy="648000"/>
-              </a:xfrm>
-              <a:prstGeom prst="straightConnector1">
-                <a:avLst/>
-              </a:prstGeom>
-              <a:ln w="38100">
-                <a:solidFill>
-                  <a:srgbClr val="376C8A"/>
-                </a:solidFill>
-                <a:tailEnd type="triangle"/>
-              </a:ln>
-            </p:spPr>
-            <p:style>
-              <a:lnRef idx="1">
-                <a:schemeClr val="accent1"/>
-              </a:lnRef>
-              <a:fillRef idx="0">
-                <a:schemeClr val="accent1"/>
-              </a:fillRef>
-              <a:effectRef idx="0">
-                <a:schemeClr val="accent1"/>
-              </a:effectRef>
-              <a:fontRef idx="minor">
-                <a:schemeClr val="tx1"/>
-              </a:fontRef>
-            </p:style>
-          </p:cxnSp>
-          <p:cxnSp>
-            <p:nvCxnSpPr>
-              <p:cNvPr id="10" name="直線矢印コネクタ 9">
-                <a:extLst>
-                  <a:ext uri="{FF2B5EF4-FFF2-40B4-BE49-F238E27FC236}">
-                    <a16:creationId xmlns:a16="http://schemas.microsoft.com/office/drawing/2014/main" id="{7DB932BF-4B18-F732-E4C6-1A0F9DCECA14}"/>
-                  </a:ext>
-                </a:extLst>
-              </p:cNvPr>
-              <p:cNvCxnSpPr>
-                <a:cxnSpLocks/>
-              </p:cNvCxnSpPr>
-              <p:nvPr/>
-            </p:nvCxnSpPr>
-            <p:spPr>
-              <a:xfrm>
-                <a:off x="5832658" y="4730411"/>
-                <a:ext cx="561600" cy="324001"/>
-              </a:xfrm>
-              <a:prstGeom prst="straightConnector1">
-                <a:avLst/>
-              </a:prstGeom>
-              <a:ln w="38100">
-                <a:solidFill>
-                  <a:srgbClr val="376C8A"/>
-                </a:solidFill>
-                <a:tailEnd type="triangle"/>
-              </a:ln>
-            </p:spPr>
-            <p:style>
-              <a:lnRef idx="1">
-                <a:schemeClr val="accent1"/>
-              </a:lnRef>
-              <a:fillRef idx="0">
-                <a:schemeClr val="accent1"/>
-              </a:fillRef>
-              <a:effectRef idx="0">
-                <a:schemeClr val="accent1"/>
-              </a:effectRef>
-              <a:fontRef idx="minor">
-                <a:schemeClr val="tx1"/>
-              </a:fontRef>
-            </p:style>
-          </p:cxnSp>
-          <p:cxnSp>
-            <p:nvCxnSpPr>
-              <p:cNvPr id="11" name="直線矢印コネクタ 10">
-                <a:extLst>
-                  <a:ext uri="{FF2B5EF4-FFF2-40B4-BE49-F238E27FC236}">
-                    <a16:creationId xmlns:a16="http://schemas.microsoft.com/office/drawing/2014/main" id="{7B8D481E-7092-B9BD-DA74-25FD05EBBDC3}"/>
-                  </a:ext>
-                </a:extLst>
-              </p:cNvPr>
-              <p:cNvCxnSpPr>
-                <a:cxnSpLocks/>
-              </p:cNvCxnSpPr>
-              <p:nvPr/>
-            </p:nvCxnSpPr>
-            <p:spPr>
-              <a:xfrm flipH="1">
-                <a:off x="5799573" y="3827091"/>
-                <a:ext cx="561600" cy="324001"/>
-              </a:xfrm>
-              <a:prstGeom prst="straightConnector1">
-                <a:avLst/>
-              </a:prstGeom>
-              <a:ln w="38100">
-                <a:solidFill>
-                  <a:srgbClr val="376C8A"/>
-                </a:solidFill>
-                <a:tailEnd type="triangle"/>
-              </a:ln>
-            </p:spPr>
-            <p:style>
-              <a:lnRef idx="1">
-                <a:schemeClr val="accent1"/>
-              </a:lnRef>
-              <a:fillRef idx="0">
-                <a:schemeClr val="accent1"/>
-              </a:fillRef>
-              <a:effectRef idx="0">
-                <a:schemeClr val="accent1"/>
-              </a:effectRef>
-              <a:fontRef idx="minor">
-                <a:schemeClr val="tx1"/>
-              </a:fontRef>
-            </p:style>
-          </p:cxnSp>
-        </p:grpSp>
-        <p:grpSp>
-          <p:nvGrpSpPr>
-            <p:cNvPr id="12" name="グループ化 11">
+            <a:prstGeom prst="straightConnector1">
+              <a:avLst/>
+            </a:prstGeom>
+            <a:ln w="38100">
+              <a:solidFill>
+                <a:srgbClr val="376C8A"/>
+              </a:solidFill>
+              <a:tailEnd type="triangle"/>
+            </a:ln>
+          </p:spPr>
+          <p:style>
+            <a:lnRef idx="1">
+              <a:schemeClr val="accent1"/>
+            </a:lnRef>
+            <a:fillRef idx="0">
+              <a:schemeClr val="accent1"/>
+            </a:fillRef>
+            <a:effectRef idx="0">
+              <a:schemeClr val="accent1"/>
+            </a:effectRef>
+            <a:fontRef idx="minor">
+              <a:schemeClr val="tx1"/>
+            </a:fontRef>
+          </p:style>
+        </p:cxnSp>
+        <p:cxnSp>
+          <p:nvCxnSpPr>
+            <p:cNvPr id="4" name="直線矢印コネクタ 3">
               <a:extLst>
                 <a:ext uri="{FF2B5EF4-FFF2-40B4-BE49-F238E27FC236}">
-                  <a16:creationId xmlns:a16="http://schemas.microsoft.com/office/drawing/2014/main" id="{F49298F8-9F0A-EA53-FABA-1C7753130608}"/>
+                  <a16:creationId xmlns:a16="http://schemas.microsoft.com/office/drawing/2014/main" id="{162A879C-FF3F-382B-02CD-2AF8E258A563}"/>
                 </a:ext>
               </a:extLst>
             </p:cNvPr>
-            <p:cNvGrpSpPr/>
+            <p:cNvCxnSpPr>
+              <a:cxnSpLocks/>
+            </p:cNvCxnSpPr>
             <p:nvPr/>
-          </p:nvGrpSpPr>
-          <p:grpSpPr>
+          </p:nvCxnSpPr>
+          <p:spPr>
             <a:xfrm>
-              <a:off x="4439816" y="1196752"/>
-              <a:ext cx="2055320" cy="2370455"/>
-              <a:chOff x="5291123" y="3779867"/>
-              <a:chExt cx="1609754" cy="1856572"/>
+              <a:off x="6972968" y="4064412"/>
+              <a:ext cx="0" cy="720000"/>
             </a:xfrm>
-          </p:grpSpPr>
-          <p:cxnSp>
-            <p:nvCxnSpPr>
-              <p:cNvPr id="13" name="直線矢印コネクタ 12">
-                <a:extLst>
-                  <a:ext uri="{FF2B5EF4-FFF2-40B4-BE49-F238E27FC236}">
-                    <a16:creationId xmlns:a16="http://schemas.microsoft.com/office/drawing/2014/main" id="{AA0E5604-79DD-9C8A-5B6A-136945C3AA7C}"/>
-                  </a:ext>
-                </a:extLst>
-              </p:cNvPr>
-              <p:cNvCxnSpPr>
-                <a:cxnSpLocks/>
-              </p:cNvCxnSpPr>
-              <p:nvPr/>
-            </p:nvCxnSpPr>
-            <p:spPr>
-              <a:xfrm>
-                <a:off x="6097214" y="3779867"/>
-                <a:ext cx="0" cy="348225"/>
-              </a:xfrm>
-              <a:prstGeom prst="straightConnector1">
-                <a:avLst/>
-              </a:prstGeom>
-              <a:ln w="38100">
-                <a:solidFill>
-                  <a:srgbClr val="F48153"/>
-                </a:solidFill>
-                <a:tailEnd type="triangle"/>
-              </a:ln>
-            </p:spPr>
-            <p:style>
-              <a:lnRef idx="1">
-                <a:schemeClr val="accent1"/>
-              </a:lnRef>
-              <a:fillRef idx="0">
-                <a:schemeClr val="accent1"/>
-              </a:fillRef>
-              <a:effectRef idx="0">
-                <a:schemeClr val="accent1"/>
-              </a:effectRef>
-              <a:fontRef idx="minor">
-                <a:schemeClr val="tx1"/>
-              </a:fontRef>
-            </p:style>
-          </p:cxnSp>
-          <p:cxnSp>
-            <p:nvCxnSpPr>
-              <p:cNvPr id="14" name="直線矢印コネクタ 13">
-                <a:extLst>
-                  <a:ext uri="{FF2B5EF4-FFF2-40B4-BE49-F238E27FC236}">
-                    <a16:creationId xmlns:a16="http://schemas.microsoft.com/office/drawing/2014/main" id="{D554C24D-FFBF-878F-BBDC-44CB5FC6B081}"/>
-                  </a:ext>
-                </a:extLst>
-              </p:cNvPr>
-              <p:cNvCxnSpPr>
-                <a:cxnSpLocks/>
-              </p:cNvCxnSpPr>
-              <p:nvPr/>
-            </p:nvCxnSpPr>
-            <p:spPr>
-              <a:xfrm>
-                <a:off x="6097214" y="5288214"/>
-                <a:ext cx="0" cy="348225"/>
-              </a:xfrm>
-              <a:prstGeom prst="straightConnector1">
-                <a:avLst/>
-              </a:prstGeom>
-              <a:ln w="38100">
-                <a:solidFill>
-                  <a:srgbClr val="F48153"/>
-                </a:solidFill>
-                <a:tailEnd type="triangle"/>
-              </a:ln>
-            </p:spPr>
-            <p:style>
-              <a:lnRef idx="1">
-                <a:schemeClr val="accent1"/>
-              </a:lnRef>
-              <a:fillRef idx="0">
-                <a:schemeClr val="accent1"/>
-              </a:fillRef>
-              <a:effectRef idx="0">
-                <a:schemeClr val="accent1"/>
-              </a:effectRef>
-              <a:fontRef idx="minor">
-                <a:schemeClr val="tx1"/>
-              </a:fontRef>
-            </p:style>
-          </p:cxnSp>
-          <p:cxnSp>
-            <p:nvCxnSpPr>
-              <p:cNvPr id="15" name="直線矢印コネクタ 14">
-                <a:extLst>
-                  <a:ext uri="{FF2B5EF4-FFF2-40B4-BE49-F238E27FC236}">
-                    <a16:creationId xmlns:a16="http://schemas.microsoft.com/office/drawing/2014/main" id="{A6C34657-C576-7401-EE68-894739E68128}"/>
-                  </a:ext>
-                </a:extLst>
-              </p:cNvPr>
-              <p:cNvCxnSpPr>
-                <a:cxnSpLocks/>
-              </p:cNvCxnSpPr>
-              <p:nvPr/>
-            </p:nvCxnSpPr>
-            <p:spPr>
-              <a:xfrm flipH="1">
-                <a:off x="6598928" y="4243540"/>
-                <a:ext cx="301795" cy="174112"/>
-              </a:xfrm>
-              <a:prstGeom prst="straightConnector1">
-                <a:avLst/>
-              </a:prstGeom>
-              <a:ln w="38100">
-                <a:solidFill>
-                  <a:srgbClr val="F48153"/>
-                </a:solidFill>
-                <a:tailEnd type="triangle"/>
-              </a:ln>
-            </p:spPr>
-            <p:style>
-              <a:lnRef idx="1">
-                <a:schemeClr val="accent1"/>
-              </a:lnRef>
-              <a:fillRef idx="0">
-                <a:schemeClr val="accent1"/>
-              </a:fillRef>
-              <a:effectRef idx="0">
-                <a:schemeClr val="accent1"/>
-              </a:effectRef>
-              <a:fontRef idx="minor">
-                <a:schemeClr val="tx1"/>
-              </a:fontRef>
-            </p:style>
-          </p:cxnSp>
-          <p:cxnSp>
-            <p:nvCxnSpPr>
-              <p:cNvPr id="16" name="直線矢印コネクタ 15">
-                <a:extLst>
-                  <a:ext uri="{FF2B5EF4-FFF2-40B4-BE49-F238E27FC236}">
-                    <a16:creationId xmlns:a16="http://schemas.microsoft.com/office/drawing/2014/main" id="{7065AFFB-4D02-3AFC-DEAF-C28F64C70029}"/>
-                  </a:ext>
-                </a:extLst>
-              </p:cNvPr>
-              <p:cNvCxnSpPr>
-                <a:cxnSpLocks/>
-              </p:cNvCxnSpPr>
-              <p:nvPr/>
-            </p:nvCxnSpPr>
-            <p:spPr>
-              <a:xfrm>
-                <a:off x="5291123" y="4243540"/>
-                <a:ext cx="301795" cy="174112"/>
-              </a:xfrm>
-              <a:prstGeom prst="straightConnector1">
-                <a:avLst/>
-              </a:prstGeom>
-              <a:ln w="38100">
-                <a:solidFill>
-                  <a:srgbClr val="F48153"/>
-                </a:solidFill>
-                <a:tailEnd type="triangle"/>
-              </a:ln>
-            </p:spPr>
-            <p:style>
-              <a:lnRef idx="1">
-                <a:schemeClr val="accent1"/>
-              </a:lnRef>
-              <a:fillRef idx="0">
-                <a:schemeClr val="accent1"/>
-              </a:fillRef>
-              <a:effectRef idx="0">
-                <a:schemeClr val="accent1"/>
-              </a:effectRef>
-              <a:fontRef idx="minor">
-                <a:schemeClr val="tx1"/>
-              </a:fontRef>
-            </p:style>
-          </p:cxnSp>
-          <p:cxnSp>
-            <p:nvCxnSpPr>
-              <p:cNvPr id="17" name="直線矢印コネクタ 16">
-                <a:extLst>
-                  <a:ext uri="{FF2B5EF4-FFF2-40B4-BE49-F238E27FC236}">
-                    <a16:creationId xmlns:a16="http://schemas.microsoft.com/office/drawing/2014/main" id="{167ED906-FD9A-28B8-FF35-15EAC1C0C449}"/>
-                  </a:ext>
-                </a:extLst>
-              </p:cNvPr>
-              <p:cNvCxnSpPr>
-                <a:cxnSpLocks/>
-              </p:cNvCxnSpPr>
-              <p:nvPr/>
-            </p:nvCxnSpPr>
-            <p:spPr>
-              <a:xfrm flipH="1">
-                <a:off x="5295481" y="4998027"/>
-                <a:ext cx="301795" cy="174112"/>
-              </a:xfrm>
-              <a:prstGeom prst="straightConnector1">
-                <a:avLst/>
-              </a:prstGeom>
-              <a:ln w="38100">
-                <a:solidFill>
-                  <a:srgbClr val="F48153"/>
-                </a:solidFill>
-                <a:tailEnd type="triangle"/>
-              </a:ln>
-            </p:spPr>
-            <p:style>
-              <a:lnRef idx="1">
-                <a:schemeClr val="accent1"/>
-              </a:lnRef>
-              <a:fillRef idx="0">
-                <a:schemeClr val="accent1"/>
-              </a:fillRef>
-              <a:effectRef idx="0">
-                <a:schemeClr val="accent1"/>
-              </a:effectRef>
-              <a:fontRef idx="minor">
-                <a:schemeClr val="tx1"/>
-              </a:fontRef>
-            </p:style>
-          </p:cxnSp>
-          <p:cxnSp>
-            <p:nvCxnSpPr>
-              <p:cNvPr id="18" name="直線矢印コネクタ 17">
-                <a:extLst>
-                  <a:ext uri="{FF2B5EF4-FFF2-40B4-BE49-F238E27FC236}">
-                    <a16:creationId xmlns:a16="http://schemas.microsoft.com/office/drawing/2014/main" id="{74DA4722-A166-D543-2A1D-EE6A64548449}"/>
-                  </a:ext>
-                </a:extLst>
-              </p:cNvPr>
-              <p:cNvCxnSpPr>
-                <a:cxnSpLocks/>
-              </p:cNvCxnSpPr>
-              <p:nvPr/>
-            </p:nvCxnSpPr>
-            <p:spPr>
-              <a:xfrm>
-                <a:off x="6599082" y="4999031"/>
-                <a:ext cx="301795" cy="174112"/>
-              </a:xfrm>
-              <a:prstGeom prst="straightConnector1">
-                <a:avLst/>
-              </a:prstGeom>
-              <a:ln w="38100">
-                <a:solidFill>
-                  <a:srgbClr val="F48153"/>
-                </a:solidFill>
-                <a:tailEnd type="triangle"/>
-              </a:ln>
-            </p:spPr>
-            <p:style>
-              <a:lnRef idx="1">
-                <a:schemeClr val="accent1"/>
-              </a:lnRef>
-              <a:fillRef idx="0">
-                <a:schemeClr val="accent1"/>
-              </a:fillRef>
-              <a:effectRef idx="0">
-                <a:schemeClr val="accent1"/>
-              </a:effectRef>
-              <a:fontRef idx="minor">
-                <a:schemeClr val="tx1"/>
-              </a:fontRef>
-            </p:style>
-          </p:cxnSp>
-        </p:grpSp>
+            <a:prstGeom prst="straightConnector1">
+              <a:avLst/>
+            </a:prstGeom>
+            <a:ln w="38100">
+              <a:solidFill>
+                <a:srgbClr val="376C8A"/>
+              </a:solidFill>
+              <a:tailEnd type="triangle"/>
+            </a:ln>
+          </p:spPr>
+          <p:style>
+            <a:lnRef idx="1">
+              <a:schemeClr val="accent1"/>
+            </a:lnRef>
+            <a:fillRef idx="0">
+              <a:schemeClr val="accent1"/>
+            </a:fillRef>
+            <a:effectRef idx="0">
+              <a:schemeClr val="accent1"/>
+            </a:effectRef>
+            <a:fontRef idx="minor">
+              <a:schemeClr val="tx1"/>
+            </a:fontRef>
+          </p:style>
+        </p:cxnSp>
+        <p:cxnSp>
+          <p:nvCxnSpPr>
+            <p:cNvPr id="5" name="直線矢印コネクタ 4">
+              <a:extLst>
+                <a:ext uri="{FF2B5EF4-FFF2-40B4-BE49-F238E27FC236}">
+                  <a16:creationId xmlns:a16="http://schemas.microsoft.com/office/drawing/2014/main" id="{DA7EB8FF-E107-E265-C819-10E4691B1F9E}"/>
+                </a:ext>
+              </a:extLst>
+            </p:cNvPr>
+            <p:cNvCxnSpPr>
+              <a:cxnSpLocks/>
+            </p:cNvCxnSpPr>
+            <p:nvPr/>
+          </p:nvCxnSpPr>
+          <p:spPr>
+            <a:xfrm flipH="1">
+              <a:off x="6350361" y="4784412"/>
+              <a:ext cx="622800" cy="360000"/>
+            </a:xfrm>
+            <a:prstGeom prst="straightConnector1">
+              <a:avLst/>
+            </a:prstGeom>
+            <a:ln w="38100">
+              <a:solidFill>
+                <a:srgbClr val="376C8A"/>
+              </a:solidFill>
+              <a:tailEnd type="triangle"/>
+            </a:ln>
+          </p:spPr>
+          <p:style>
+            <a:lnRef idx="1">
+              <a:schemeClr val="accent1"/>
+            </a:lnRef>
+            <a:fillRef idx="0">
+              <a:schemeClr val="accent1"/>
+            </a:fillRef>
+            <a:effectRef idx="0">
+              <a:schemeClr val="accent1"/>
+            </a:effectRef>
+            <a:fontRef idx="minor">
+              <a:schemeClr val="tx1"/>
+            </a:fontRef>
+          </p:style>
+        </p:cxnSp>
+        <p:cxnSp>
+          <p:nvCxnSpPr>
+            <p:cNvPr id="6" name="直線矢印コネクタ 5">
+              <a:extLst>
+                <a:ext uri="{FF2B5EF4-FFF2-40B4-BE49-F238E27FC236}">
+                  <a16:creationId xmlns:a16="http://schemas.microsoft.com/office/drawing/2014/main" id="{076EA254-4445-E77A-35FC-B486FA165896}"/>
+                </a:ext>
+              </a:extLst>
+            </p:cNvPr>
+            <p:cNvCxnSpPr>
+              <a:cxnSpLocks/>
+            </p:cNvCxnSpPr>
+            <p:nvPr/>
+          </p:nvCxnSpPr>
+          <p:spPr>
+            <a:xfrm flipH="1" flipV="1">
+              <a:off x="5727561" y="4784412"/>
+              <a:ext cx="622800" cy="360000"/>
+            </a:xfrm>
+            <a:prstGeom prst="straightConnector1">
+              <a:avLst/>
+            </a:prstGeom>
+            <a:ln w="38100">
+              <a:solidFill>
+                <a:srgbClr val="376C8A"/>
+              </a:solidFill>
+              <a:tailEnd type="triangle"/>
+            </a:ln>
+          </p:spPr>
+          <p:style>
+            <a:lnRef idx="1">
+              <a:schemeClr val="accent1"/>
+            </a:lnRef>
+            <a:fillRef idx="0">
+              <a:schemeClr val="accent1"/>
+            </a:fillRef>
+            <a:effectRef idx="0">
+              <a:schemeClr val="accent1"/>
+            </a:effectRef>
+            <a:fontRef idx="minor">
+              <a:schemeClr val="tx1"/>
+            </a:fontRef>
+          </p:style>
+        </p:cxnSp>
+        <p:cxnSp>
+          <p:nvCxnSpPr>
+            <p:cNvPr id="7" name="直線矢印コネクタ 6">
+              <a:extLst>
+                <a:ext uri="{FF2B5EF4-FFF2-40B4-BE49-F238E27FC236}">
+                  <a16:creationId xmlns:a16="http://schemas.microsoft.com/office/drawing/2014/main" id="{677D3DB2-551C-A797-CB78-D710B47673B2}"/>
+                </a:ext>
+              </a:extLst>
+            </p:cNvPr>
+            <p:cNvCxnSpPr>
+              <a:cxnSpLocks/>
+            </p:cNvCxnSpPr>
+            <p:nvPr/>
+          </p:nvCxnSpPr>
+          <p:spPr>
+            <a:xfrm flipV="1">
+              <a:off x="5724741" y="4064412"/>
+              <a:ext cx="0" cy="720000"/>
+            </a:xfrm>
+            <a:prstGeom prst="straightConnector1">
+              <a:avLst/>
+            </a:prstGeom>
+            <a:ln w="38100">
+              <a:solidFill>
+                <a:srgbClr val="376C8A"/>
+              </a:solidFill>
+              <a:tailEnd type="triangle"/>
+            </a:ln>
+          </p:spPr>
+          <p:style>
+            <a:lnRef idx="1">
+              <a:schemeClr val="accent1"/>
+            </a:lnRef>
+            <a:fillRef idx="0">
+              <a:schemeClr val="accent1"/>
+            </a:fillRef>
+            <a:effectRef idx="0">
+              <a:schemeClr val="accent1"/>
+            </a:effectRef>
+            <a:fontRef idx="minor">
+              <a:schemeClr val="tx1"/>
+            </a:fontRef>
+          </p:style>
+        </p:cxnSp>
+        <p:cxnSp>
+          <p:nvCxnSpPr>
+            <p:cNvPr id="8" name="直線矢印コネクタ 7">
+              <a:extLst>
+                <a:ext uri="{FF2B5EF4-FFF2-40B4-BE49-F238E27FC236}">
+                  <a16:creationId xmlns:a16="http://schemas.microsoft.com/office/drawing/2014/main" id="{24C3E8C4-8FB0-DAE9-7A3A-BD45DF3AB916}"/>
+                </a:ext>
+              </a:extLst>
+            </p:cNvPr>
+            <p:cNvCxnSpPr>
+              <a:cxnSpLocks/>
+            </p:cNvCxnSpPr>
+            <p:nvPr/>
+          </p:nvCxnSpPr>
+          <p:spPr>
+            <a:xfrm flipV="1">
+              <a:off x="5727561" y="3705189"/>
+              <a:ext cx="622800" cy="360000"/>
+            </a:xfrm>
+            <a:prstGeom prst="straightConnector1">
+              <a:avLst/>
+            </a:prstGeom>
+            <a:ln w="38100">
+              <a:solidFill>
+                <a:srgbClr val="376C8A"/>
+              </a:solidFill>
+              <a:tailEnd type="triangle"/>
+            </a:ln>
+          </p:spPr>
+          <p:style>
+            <a:lnRef idx="1">
+              <a:schemeClr val="accent1"/>
+            </a:lnRef>
+            <a:fillRef idx="0">
+              <a:schemeClr val="accent1"/>
+            </a:fillRef>
+            <a:effectRef idx="0">
+              <a:schemeClr val="accent1"/>
+            </a:effectRef>
+            <a:fontRef idx="minor">
+              <a:schemeClr val="tx1"/>
+            </a:fontRef>
+          </p:style>
+        </p:cxnSp>
+        <p:cxnSp>
+          <p:nvCxnSpPr>
+            <p:cNvPr id="9" name="直線矢印コネクタ 8">
+              <a:extLst>
+                <a:ext uri="{FF2B5EF4-FFF2-40B4-BE49-F238E27FC236}">
+                  <a16:creationId xmlns:a16="http://schemas.microsoft.com/office/drawing/2014/main" id="{3D15182A-1AB4-CAD4-9101-68FA82958F00}"/>
+                </a:ext>
+              </a:extLst>
+            </p:cNvPr>
+            <p:cNvCxnSpPr>
+              <a:cxnSpLocks/>
+            </p:cNvCxnSpPr>
+            <p:nvPr/>
+          </p:nvCxnSpPr>
+          <p:spPr>
+            <a:xfrm flipV="1">
+              <a:off x="6884844" y="4064412"/>
+              <a:ext cx="0" cy="648000"/>
+            </a:xfrm>
+            <a:prstGeom prst="straightConnector1">
+              <a:avLst/>
+            </a:prstGeom>
+            <a:ln w="38100">
+              <a:solidFill>
+                <a:srgbClr val="376C8A"/>
+              </a:solidFill>
+              <a:tailEnd type="triangle"/>
+            </a:ln>
+          </p:spPr>
+          <p:style>
+            <a:lnRef idx="1">
+              <a:schemeClr val="accent1"/>
+            </a:lnRef>
+            <a:fillRef idx="0">
+              <a:schemeClr val="accent1"/>
+            </a:fillRef>
+            <a:effectRef idx="0">
+              <a:schemeClr val="accent1"/>
+            </a:effectRef>
+            <a:fontRef idx="minor">
+              <a:schemeClr val="tx1"/>
+            </a:fontRef>
+          </p:style>
+        </p:cxnSp>
+        <p:cxnSp>
+          <p:nvCxnSpPr>
+            <p:cNvPr id="10" name="直線矢印コネクタ 9">
+              <a:extLst>
+                <a:ext uri="{FF2B5EF4-FFF2-40B4-BE49-F238E27FC236}">
+                  <a16:creationId xmlns:a16="http://schemas.microsoft.com/office/drawing/2014/main" id="{7DB932BF-4B18-F732-E4C6-1A0F9DCECA14}"/>
+                </a:ext>
+              </a:extLst>
+            </p:cNvPr>
+            <p:cNvCxnSpPr>
+              <a:cxnSpLocks/>
+            </p:cNvCxnSpPr>
+            <p:nvPr/>
+          </p:nvCxnSpPr>
+          <p:spPr>
+            <a:xfrm>
+              <a:off x="5832658" y="4730411"/>
+              <a:ext cx="561600" cy="324001"/>
+            </a:xfrm>
+            <a:prstGeom prst="straightConnector1">
+              <a:avLst/>
+            </a:prstGeom>
+            <a:ln w="38100">
+              <a:solidFill>
+                <a:srgbClr val="376C8A"/>
+              </a:solidFill>
+              <a:tailEnd type="triangle"/>
+            </a:ln>
+          </p:spPr>
+          <p:style>
+            <a:lnRef idx="1">
+              <a:schemeClr val="accent1"/>
+            </a:lnRef>
+            <a:fillRef idx="0">
+              <a:schemeClr val="accent1"/>
+            </a:fillRef>
+            <a:effectRef idx="0">
+              <a:schemeClr val="accent1"/>
+            </a:effectRef>
+            <a:fontRef idx="minor">
+              <a:schemeClr val="tx1"/>
+            </a:fontRef>
+          </p:style>
+        </p:cxnSp>
+        <p:cxnSp>
+          <p:nvCxnSpPr>
+            <p:cNvPr id="11" name="直線矢印コネクタ 10">
+              <a:extLst>
+                <a:ext uri="{FF2B5EF4-FFF2-40B4-BE49-F238E27FC236}">
+                  <a16:creationId xmlns:a16="http://schemas.microsoft.com/office/drawing/2014/main" id="{7B8D481E-7092-B9BD-DA74-25FD05EBBDC3}"/>
+                </a:ext>
+              </a:extLst>
+            </p:cNvPr>
+            <p:cNvCxnSpPr>
+              <a:cxnSpLocks/>
+            </p:cNvCxnSpPr>
+            <p:nvPr/>
+          </p:nvCxnSpPr>
+          <p:spPr>
+            <a:xfrm flipH="1">
+              <a:off x="5799573" y="3827091"/>
+              <a:ext cx="561600" cy="324001"/>
+            </a:xfrm>
+            <a:prstGeom prst="straightConnector1">
+              <a:avLst/>
+            </a:prstGeom>
+            <a:ln w="38100">
+              <a:solidFill>
+                <a:srgbClr val="376C8A"/>
+              </a:solidFill>
+              <a:tailEnd type="triangle"/>
+            </a:ln>
+          </p:spPr>
+          <p:style>
+            <a:lnRef idx="1">
+              <a:schemeClr val="accent1"/>
+            </a:lnRef>
+            <a:fillRef idx="0">
+              <a:schemeClr val="accent1"/>
+            </a:fillRef>
+            <a:effectRef idx="0">
+              <a:schemeClr val="accent1"/>
+            </a:effectRef>
+            <a:fontRef idx="minor">
+              <a:schemeClr val="tx1"/>
+            </a:fontRef>
+          </p:style>
+        </p:cxnSp>
+      </p:grpSp>
+      <p:grpSp>
+        <p:nvGrpSpPr>
+          <p:cNvPr id="12" name="グループ化 11">
+            <a:extLst>
+              <a:ext uri="{FF2B5EF4-FFF2-40B4-BE49-F238E27FC236}">
+                <a16:creationId xmlns:a16="http://schemas.microsoft.com/office/drawing/2014/main" id="{F49298F8-9F0A-EA53-FABA-1C7753130608}"/>
+              </a:ext>
+            </a:extLst>
+          </p:cNvPr>
+          <p:cNvGrpSpPr/>
+          <p:nvPr/>
+        </p:nvGrpSpPr>
+        <p:grpSpPr>
+          <a:xfrm>
+            <a:off x="3071664" y="1196752"/>
+            <a:ext cx="2055320" cy="2370455"/>
+            <a:chOff x="5291123" y="3779867"/>
+            <a:chExt cx="1609754" cy="1856572"/>
+          </a:xfrm>
+        </p:grpSpPr>
+        <p:cxnSp>
+          <p:nvCxnSpPr>
+            <p:cNvPr id="13" name="直線矢印コネクタ 12">
+              <a:extLst>
+                <a:ext uri="{FF2B5EF4-FFF2-40B4-BE49-F238E27FC236}">
+                  <a16:creationId xmlns:a16="http://schemas.microsoft.com/office/drawing/2014/main" id="{AA0E5604-79DD-9C8A-5B6A-136945C3AA7C}"/>
+                </a:ext>
+              </a:extLst>
+            </p:cNvPr>
+            <p:cNvCxnSpPr>
+              <a:cxnSpLocks/>
+            </p:cNvCxnSpPr>
+            <p:nvPr/>
+          </p:nvCxnSpPr>
+          <p:spPr>
+            <a:xfrm>
+              <a:off x="6097214" y="3779867"/>
+              <a:ext cx="0" cy="348225"/>
+            </a:xfrm>
+            <a:prstGeom prst="straightConnector1">
+              <a:avLst/>
+            </a:prstGeom>
+            <a:ln w="38100">
+              <a:solidFill>
+                <a:srgbClr val="F48153"/>
+              </a:solidFill>
+              <a:tailEnd type="triangle"/>
+            </a:ln>
+          </p:spPr>
+          <p:style>
+            <a:lnRef idx="1">
+              <a:schemeClr val="accent1"/>
+            </a:lnRef>
+            <a:fillRef idx="0">
+              <a:schemeClr val="accent1"/>
+            </a:fillRef>
+            <a:effectRef idx="0">
+              <a:schemeClr val="accent1"/>
+            </a:effectRef>
+            <a:fontRef idx="minor">
+              <a:schemeClr val="tx1"/>
+            </a:fontRef>
+          </p:style>
+        </p:cxnSp>
+        <p:cxnSp>
+          <p:nvCxnSpPr>
+            <p:cNvPr id="14" name="直線矢印コネクタ 13">
+              <a:extLst>
+                <a:ext uri="{FF2B5EF4-FFF2-40B4-BE49-F238E27FC236}">
+                  <a16:creationId xmlns:a16="http://schemas.microsoft.com/office/drawing/2014/main" id="{D554C24D-FFBF-878F-BBDC-44CB5FC6B081}"/>
+                </a:ext>
+              </a:extLst>
+            </p:cNvPr>
+            <p:cNvCxnSpPr>
+              <a:cxnSpLocks/>
+            </p:cNvCxnSpPr>
+            <p:nvPr/>
+          </p:nvCxnSpPr>
+          <p:spPr>
+            <a:xfrm>
+              <a:off x="6097214" y="5288214"/>
+              <a:ext cx="0" cy="348225"/>
+            </a:xfrm>
+            <a:prstGeom prst="straightConnector1">
+              <a:avLst/>
+            </a:prstGeom>
+            <a:ln w="38100">
+              <a:solidFill>
+                <a:srgbClr val="F48153"/>
+              </a:solidFill>
+              <a:tailEnd type="triangle"/>
+            </a:ln>
+          </p:spPr>
+          <p:style>
+            <a:lnRef idx="1">
+              <a:schemeClr val="accent1"/>
+            </a:lnRef>
+            <a:fillRef idx="0">
+              <a:schemeClr val="accent1"/>
+            </a:fillRef>
+            <a:effectRef idx="0">
+              <a:schemeClr val="accent1"/>
+            </a:effectRef>
+            <a:fontRef idx="minor">
+              <a:schemeClr val="tx1"/>
+            </a:fontRef>
+          </p:style>
+        </p:cxnSp>
+        <p:cxnSp>
+          <p:nvCxnSpPr>
+            <p:cNvPr id="15" name="直線矢印コネクタ 14">
+              <a:extLst>
+                <a:ext uri="{FF2B5EF4-FFF2-40B4-BE49-F238E27FC236}">
+                  <a16:creationId xmlns:a16="http://schemas.microsoft.com/office/drawing/2014/main" id="{A6C34657-C576-7401-EE68-894739E68128}"/>
+                </a:ext>
+              </a:extLst>
+            </p:cNvPr>
+            <p:cNvCxnSpPr>
+              <a:cxnSpLocks/>
+            </p:cNvCxnSpPr>
+            <p:nvPr/>
+          </p:nvCxnSpPr>
+          <p:spPr>
+            <a:xfrm flipH="1">
+              <a:off x="6598928" y="4243540"/>
+              <a:ext cx="301795" cy="174112"/>
+            </a:xfrm>
+            <a:prstGeom prst="straightConnector1">
+              <a:avLst/>
+            </a:prstGeom>
+            <a:ln w="38100">
+              <a:solidFill>
+                <a:srgbClr val="F48153"/>
+              </a:solidFill>
+              <a:tailEnd type="triangle"/>
+            </a:ln>
+          </p:spPr>
+          <p:style>
+            <a:lnRef idx="1">
+              <a:schemeClr val="accent1"/>
+            </a:lnRef>
+            <a:fillRef idx="0">
+              <a:schemeClr val="accent1"/>
+            </a:fillRef>
+            <a:effectRef idx="0">
+              <a:schemeClr val="accent1"/>
+            </a:effectRef>
+            <a:fontRef idx="minor">
+              <a:schemeClr val="tx1"/>
+            </a:fontRef>
+          </p:style>
+        </p:cxnSp>
+        <p:cxnSp>
+          <p:nvCxnSpPr>
+            <p:cNvPr id="16" name="直線矢印コネクタ 15">
+              <a:extLst>
+                <a:ext uri="{FF2B5EF4-FFF2-40B4-BE49-F238E27FC236}">
+                  <a16:creationId xmlns:a16="http://schemas.microsoft.com/office/drawing/2014/main" id="{7065AFFB-4D02-3AFC-DEAF-C28F64C70029}"/>
+                </a:ext>
+              </a:extLst>
+            </p:cNvPr>
+            <p:cNvCxnSpPr>
+              <a:cxnSpLocks/>
+            </p:cNvCxnSpPr>
+            <p:nvPr/>
+          </p:nvCxnSpPr>
+          <p:spPr>
+            <a:xfrm>
+              <a:off x="5291123" y="4243540"/>
+              <a:ext cx="301795" cy="174112"/>
+            </a:xfrm>
+            <a:prstGeom prst="straightConnector1">
+              <a:avLst/>
+            </a:prstGeom>
+            <a:ln w="38100">
+              <a:solidFill>
+                <a:srgbClr val="F48153"/>
+              </a:solidFill>
+              <a:tailEnd type="triangle"/>
+            </a:ln>
+          </p:spPr>
+          <p:style>
+            <a:lnRef idx="1">
+              <a:schemeClr val="accent1"/>
+            </a:lnRef>
+            <a:fillRef idx="0">
+              <a:schemeClr val="accent1"/>
+            </a:fillRef>
+            <a:effectRef idx="0">
+              <a:schemeClr val="accent1"/>
+            </a:effectRef>
+            <a:fontRef idx="minor">
+              <a:schemeClr val="tx1"/>
+            </a:fontRef>
+          </p:style>
+        </p:cxnSp>
+        <p:cxnSp>
+          <p:nvCxnSpPr>
+            <p:cNvPr id="17" name="直線矢印コネクタ 16">
+              <a:extLst>
+                <a:ext uri="{FF2B5EF4-FFF2-40B4-BE49-F238E27FC236}">
+                  <a16:creationId xmlns:a16="http://schemas.microsoft.com/office/drawing/2014/main" id="{167ED906-FD9A-28B8-FF35-15EAC1C0C449}"/>
+                </a:ext>
+              </a:extLst>
+            </p:cNvPr>
+            <p:cNvCxnSpPr>
+              <a:cxnSpLocks/>
+            </p:cNvCxnSpPr>
+            <p:nvPr/>
+          </p:nvCxnSpPr>
+          <p:spPr>
+            <a:xfrm flipH="1">
+              <a:off x="5295481" y="4998027"/>
+              <a:ext cx="301795" cy="174112"/>
+            </a:xfrm>
+            <a:prstGeom prst="straightConnector1">
+              <a:avLst/>
+            </a:prstGeom>
+            <a:ln w="38100">
+              <a:solidFill>
+                <a:srgbClr val="F48153"/>
+              </a:solidFill>
+              <a:tailEnd type="triangle"/>
+            </a:ln>
+          </p:spPr>
+          <p:style>
+            <a:lnRef idx="1">
+              <a:schemeClr val="accent1"/>
+            </a:lnRef>
+            <a:fillRef idx="0">
+              <a:schemeClr val="accent1"/>
+            </a:fillRef>
+            <a:effectRef idx="0">
+              <a:schemeClr val="accent1"/>
+            </a:effectRef>
+            <a:fontRef idx="minor">
+              <a:schemeClr val="tx1"/>
+            </a:fontRef>
+          </p:style>
+        </p:cxnSp>
+        <p:cxnSp>
+          <p:nvCxnSpPr>
+            <p:cNvPr id="18" name="直線矢印コネクタ 17">
+              <a:extLst>
+                <a:ext uri="{FF2B5EF4-FFF2-40B4-BE49-F238E27FC236}">
+                  <a16:creationId xmlns:a16="http://schemas.microsoft.com/office/drawing/2014/main" id="{74DA4722-A166-D543-2A1D-EE6A64548449}"/>
+                </a:ext>
+              </a:extLst>
+            </p:cNvPr>
+            <p:cNvCxnSpPr>
+              <a:cxnSpLocks/>
+            </p:cNvCxnSpPr>
+            <p:nvPr/>
+          </p:nvCxnSpPr>
+          <p:spPr>
+            <a:xfrm>
+              <a:off x="6599082" y="4999031"/>
+              <a:ext cx="301795" cy="174112"/>
+            </a:xfrm>
+            <a:prstGeom prst="straightConnector1">
+              <a:avLst/>
+            </a:prstGeom>
+            <a:ln w="38100">
+              <a:solidFill>
+                <a:srgbClr val="F48153"/>
+              </a:solidFill>
+              <a:tailEnd type="triangle"/>
+            </a:ln>
+          </p:spPr>
+          <p:style>
+            <a:lnRef idx="1">
+              <a:schemeClr val="accent1"/>
+            </a:lnRef>
+            <a:fillRef idx="0">
+              <a:schemeClr val="accent1"/>
+            </a:fillRef>
+            <a:effectRef idx="0">
+              <a:schemeClr val="accent1"/>
+            </a:effectRef>
+            <a:fontRef idx="minor">
+              <a:schemeClr val="tx1"/>
+            </a:fontRef>
+          </p:style>
+        </p:cxnSp>
+      </p:grpSp>
+      <p:grpSp>
+        <p:nvGrpSpPr>
+          <p:cNvPr id="20" name="グループ化 19">
+            <a:extLst>
+              <a:ext uri="{FF2B5EF4-FFF2-40B4-BE49-F238E27FC236}">
+                <a16:creationId xmlns:a16="http://schemas.microsoft.com/office/drawing/2014/main" id="{D6C231B6-032C-339A-F41D-EB666BBCE3BD}"/>
+              </a:ext>
+            </a:extLst>
+          </p:cNvPr>
+          <p:cNvGrpSpPr/>
+          <p:nvPr/>
+        </p:nvGrpSpPr>
+        <p:grpSpPr>
+          <a:xfrm>
+            <a:off x="6816080" y="1746752"/>
+            <a:ext cx="1102029" cy="1270457"/>
+            <a:chOff x="5724741" y="3705189"/>
+            <a:chExt cx="1248420" cy="1439223"/>
+          </a:xfrm>
+        </p:grpSpPr>
+        <p:cxnSp>
+          <p:nvCxnSpPr>
+            <p:cNvPr id="21" name="直線矢印コネクタ 20">
+              <a:extLst>
+                <a:ext uri="{FF2B5EF4-FFF2-40B4-BE49-F238E27FC236}">
+                  <a16:creationId xmlns:a16="http://schemas.microsoft.com/office/drawing/2014/main" id="{52743D8E-A9F6-C65D-6DC8-974398AC3B31}"/>
+                </a:ext>
+              </a:extLst>
+            </p:cNvPr>
+            <p:cNvCxnSpPr>
+              <a:cxnSpLocks/>
+            </p:cNvCxnSpPr>
+            <p:nvPr/>
+          </p:nvCxnSpPr>
+          <p:spPr>
+            <a:xfrm>
+              <a:off x="6350361" y="3705189"/>
+              <a:ext cx="622800" cy="360000"/>
+            </a:xfrm>
+            <a:prstGeom prst="straightConnector1">
+              <a:avLst/>
+            </a:prstGeom>
+            <a:ln w="38100">
+              <a:solidFill>
+                <a:srgbClr val="06466E"/>
+              </a:solidFill>
+              <a:tailEnd type="triangle"/>
+            </a:ln>
+          </p:spPr>
+          <p:style>
+            <a:lnRef idx="1">
+              <a:schemeClr val="accent1"/>
+            </a:lnRef>
+            <a:fillRef idx="0">
+              <a:schemeClr val="accent1"/>
+            </a:fillRef>
+            <a:effectRef idx="0">
+              <a:schemeClr val="accent1"/>
+            </a:effectRef>
+            <a:fontRef idx="minor">
+              <a:schemeClr val="tx1"/>
+            </a:fontRef>
+          </p:style>
+        </p:cxnSp>
+        <p:cxnSp>
+          <p:nvCxnSpPr>
+            <p:cNvPr id="22" name="直線矢印コネクタ 21">
+              <a:extLst>
+                <a:ext uri="{FF2B5EF4-FFF2-40B4-BE49-F238E27FC236}">
+                  <a16:creationId xmlns:a16="http://schemas.microsoft.com/office/drawing/2014/main" id="{1EEC9209-B49F-9B9D-FFA4-8C7AE295E2F9}"/>
+                </a:ext>
+              </a:extLst>
+            </p:cNvPr>
+            <p:cNvCxnSpPr>
+              <a:cxnSpLocks/>
+            </p:cNvCxnSpPr>
+            <p:nvPr/>
+          </p:nvCxnSpPr>
+          <p:spPr>
+            <a:xfrm>
+              <a:off x="6972968" y="4064412"/>
+              <a:ext cx="0" cy="720000"/>
+            </a:xfrm>
+            <a:prstGeom prst="straightConnector1">
+              <a:avLst/>
+            </a:prstGeom>
+            <a:ln w="38100">
+              <a:solidFill>
+                <a:srgbClr val="06466E"/>
+              </a:solidFill>
+              <a:tailEnd type="triangle"/>
+            </a:ln>
+          </p:spPr>
+          <p:style>
+            <a:lnRef idx="1">
+              <a:schemeClr val="accent1"/>
+            </a:lnRef>
+            <a:fillRef idx="0">
+              <a:schemeClr val="accent1"/>
+            </a:fillRef>
+            <a:effectRef idx="0">
+              <a:schemeClr val="accent1"/>
+            </a:effectRef>
+            <a:fontRef idx="minor">
+              <a:schemeClr val="tx1"/>
+            </a:fontRef>
+          </p:style>
+        </p:cxnSp>
+        <p:cxnSp>
+          <p:nvCxnSpPr>
+            <p:cNvPr id="23" name="直線矢印コネクタ 22">
+              <a:extLst>
+                <a:ext uri="{FF2B5EF4-FFF2-40B4-BE49-F238E27FC236}">
+                  <a16:creationId xmlns:a16="http://schemas.microsoft.com/office/drawing/2014/main" id="{14DF07D5-D5C5-A86E-47EE-B3ACB474196C}"/>
+                </a:ext>
+              </a:extLst>
+            </p:cNvPr>
+            <p:cNvCxnSpPr>
+              <a:cxnSpLocks/>
+            </p:cNvCxnSpPr>
+            <p:nvPr/>
+          </p:nvCxnSpPr>
+          <p:spPr>
+            <a:xfrm flipH="1">
+              <a:off x="6350361" y="4784412"/>
+              <a:ext cx="622800" cy="360000"/>
+            </a:xfrm>
+            <a:prstGeom prst="straightConnector1">
+              <a:avLst/>
+            </a:prstGeom>
+            <a:ln w="38100">
+              <a:solidFill>
+                <a:srgbClr val="06466E"/>
+              </a:solidFill>
+              <a:tailEnd type="triangle"/>
+            </a:ln>
+          </p:spPr>
+          <p:style>
+            <a:lnRef idx="1">
+              <a:schemeClr val="accent1"/>
+            </a:lnRef>
+            <a:fillRef idx="0">
+              <a:schemeClr val="accent1"/>
+            </a:fillRef>
+            <a:effectRef idx="0">
+              <a:schemeClr val="accent1"/>
+            </a:effectRef>
+            <a:fontRef idx="minor">
+              <a:schemeClr val="tx1"/>
+            </a:fontRef>
+          </p:style>
+        </p:cxnSp>
+        <p:cxnSp>
+          <p:nvCxnSpPr>
+            <p:cNvPr id="24" name="直線矢印コネクタ 23">
+              <a:extLst>
+                <a:ext uri="{FF2B5EF4-FFF2-40B4-BE49-F238E27FC236}">
+                  <a16:creationId xmlns:a16="http://schemas.microsoft.com/office/drawing/2014/main" id="{13E417BC-8843-80E8-3A32-EF83E76CC4C7}"/>
+                </a:ext>
+              </a:extLst>
+            </p:cNvPr>
+            <p:cNvCxnSpPr>
+              <a:cxnSpLocks/>
+            </p:cNvCxnSpPr>
+            <p:nvPr/>
+          </p:nvCxnSpPr>
+          <p:spPr>
+            <a:xfrm flipH="1" flipV="1">
+              <a:off x="5727561" y="4784412"/>
+              <a:ext cx="622800" cy="360000"/>
+            </a:xfrm>
+            <a:prstGeom prst="straightConnector1">
+              <a:avLst/>
+            </a:prstGeom>
+            <a:ln w="38100">
+              <a:solidFill>
+                <a:srgbClr val="06466E"/>
+              </a:solidFill>
+              <a:tailEnd type="triangle"/>
+            </a:ln>
+          </p:spPr>
+          <p:style>
+            <a:lnRef idx="1">
+              <a:schemeClr val="accent1"/>
+            </a:lnRef>
+            <a:fillRef idx="0">
+              <a:schemeClr val="accent1"/>
+            </a:fillRef>
+            <a:effectRef idx="0">
+              <a:schemeClr val="accent1"/>
+            </a:effectRef>
+            <a:fontRef idx="minor">
+              <a:schemeClr val="tx1"/>
+            </a:fontRef>
+          </p:style>
+        </p:cxnSp>
+        <p:cxnSp>
+          <p:nvCxnSpPr>
+            <p:cNvPr id="25" name="直線矢印コネクタ 24">
+              <a:extLst>
+                <a:ext uri="{FF2B5EF4-FFF2-40B4-BE49-F238E27FC236}">
+                  <a16:creationId xmlns:a16="http://schemas.microsoft.com/office/drawing/2014/main" id="{922588D0-A541-5FA3-AF18-8C52EA9CFE85}"/>
+                </a:ext>
+              </a:extLst>
+            </p:cNvPr>
+            <p:cNvCxnSpPr>
+              <a:cxnSpLocks/>
+            </p:cNvCxnSpPr>
+            <p:nvPr/>
+          </p:nvCxnSpPr>
+          <p:spPr>
+            <a:xfrm flipV="1">
+              <a:off x="5724741" y="4064412"/>
+              <a:ext cx="0" cy="720000"/>
+            </a:xfrm>
+            <a:prstGeom prst="straightConnector1">
+              <a:avLst/>
+            </a:prstGeom>
+            <a:ln w="38100">
+              <a:solidFill>
+                <a:srgbClr val="06466E"/>
+              </a:solidFill>
+              <a:tailEnd type="triangle"/>
+            </a:ln>
+          </p:spPr>
+          <p:style>
+            <a:lnRef idx="1">
+              <a:schemeClr val="accent1"/>
+            </a:lnRef>
+            <a:fillRef idx="0">
+              <a:schemeClr val="accent1"/>
+            </a:fillRef>
+            <a:effectRef idx="0">
+              <a:schemeClr val="accent1"/>
+            </a:effectRef>
+            <a:fontRef idx="minor">
+              <a:schemeClr val="tx1"/>
+            </a:fontRef>
+          </p:style>
+        </p:cxnSp>
+        <p:cxnSp>
+          <p:nvCxnSpPr>
+            <p:cNvPr id="26" name="直線矢印コネクタ 25">
+              <a:extLst>
+                <a:ext uri="{FF2B5EF4-FFF2-40B4-BE49-F238E27FC236}">
+                  <a16:creationId xmlns:a16="http://schemas.microsoft.com/office/drawing/2014/main" id="{8692786D-6721-1C21-EF58-6E59F1DF1980}"/>
+                </a:ext>
+              </a:extLst>
+            </p:cNvPr>
+            <p:cNvCxnSpPr>
+              <a:cxnSpLocks/>
+            </p:cNvCxnSpPr>
+            <p:nvPr/>
+          </p:nvCxnSpPr>
+          <p:spPr>
+            <a:xfrm flipV="1">
+              <a:off x="5727561" y="3705189"/>
+              <a:ext cx="622800" cy="360000"/>
+            </a:xfrm>
+            <a:prstGeom prst="straightConnector1">
+              <a:avLst/>
+            </a:prstGeom>
+            <a:ln w="38100">
+              <a:solidFill>
+                <a:srgbClr val="06466E"/>
+              </a:solidFill>
+              <a:tailEnd type="triangle"/>
+            </a:ln>
+          </p:spPr>
+          <p:style>
+            <a:lnRef idx="1">
+              <a:schemeClr val="accent1"/>
+            </a:lnRef>
+            <a:fillRef idx="0">
+              <a:schemeClr val="accent1"/>
+            </a:fillRef>
+            <a:effectRef idx="0">
+              <a:schemeClr val="accent1"/>
+            </a:effectRef>
+            <a:fontRef idx="minor">
+              <a:schemeClr val="tx1"/>
+            </a:fontRef>
+          </p:style>
+        </p:cxnSp>
+        <p:cxnSp>
+          <p:nvCxnSpPr>
+            <p:cNvPr id="27" name="直線矢印コネクタ 26">
+              <a:extLst>
+                <a:ext uri="{FF2B5EF4-FFF2-40B4-BE49-F238E27FC236}">
+                  <a16:creationId xmlns:a16="http://schemas.microsoft.com/office/drawing/2014/main" id="{3692AFA6-9FFB-0427-B39E-4FB4E8770081}"/>
+                </a:ext>
+              </a:extLst>
+            </p:cNvPr>
+            <p:cNvCxnSpPr>
+              <a:cxnSpLocks/>
+            </p:cNvCxnSpPr>
+            <p:nvPr/>
+          </p:nvCxnSpPr>
+          <p:spPr>
+            <a:xfrm flipV="1">
+              <a:off x="6884844" y="4064412"/>
+              <a:ext cx="0" cy="648000"/>
+            </a:xfrm>
+            <a:prstGeom prst="straightConnector1">
+              <a:avLst/>
+            </a:prstGeom>
+            <a:ln w="38100">
+              <a:solidFill>
+                <a:srgbClr val="06466E"/>
+              </a:solidFill>
+              <a:tailEnd type="triangle"/>
+            </a:ln>
+          </p:spPr>
+          <p:style>
+            <a:lnRef idx="1">
+              <a:schemeClr val="accent1"/>
+            </a:lnRef>
+            <a:fillRef idx="0">
+              <a:schemeClr val="accent1"/>
+            </a:fillRef>
+            <a:effectRef idx="0">
+              <a:schemeClr val="accent1"/>
+            </a:effectRef>
+            <a:fontRef idx="minor">
+              <a:schemeClr val="tx1"/>
+            </a:fontRef>
+          </p:style>
+        </p:cxnSp>
+        <p:cxnSp>
+          <p:nvCxnSpPr>
+            <p:cNvPr id="28" name="直線矢印コネクタ 27">
+              <a:extLst>
+                <a:ext uri="{FF2B5EF4-FFF2-40B4-BE49-F238E27FC236}">
+                  <a16:creationId xmlns:a16="http://schemas.microsoft.com/office/drawing/2014/main" id="{BA8BB204-8B1B-B98B-5B2C-323642C2CF31}"/>
+                </a:ext>
+              </a:extLst>
+            </p:cNvPr>
+            <p:cNvCxnSpPr>
+              <a:cxnSpLocks/>
+            </p:cNvCxnSpPr>
+            <p:nvPr/>
+          </p:nvCxnSpPr>
+          <p:spPr>
+            <a:xfrm>
+              <a:off x="5832658" y="4730411"/>
+              <a:ext cx="561600" cy="324001"/>
+            </a:xfrm>
+            <a:prstGeom prst="straightConnector1">
+              <a:avLst/>
+            </a:prstGeom>
+            <a:ln w="38100">
+              <a:solidFill>
+                <a:srgbClr val="06466E"/>
+              </a:solidFill>
+              <a:tailEnd type="triangle"/>
+            </a:ln>
+          </p:spPr>
+          <p:style>
+            <a:lnRef idx="1">
+              <a:schemeClr val="accent1"/>
+            </a:lnRef>
+            <a:fillRef idx="0">
+              <a:schemeClr val="accent1"/>
+            </a:fillRef>
+            <a:effectRef idx="0">
+              <a:schemeClr val="accent1"/>
+            </a:effectRef>
+            <a:fontRef idx="minor">
+              <a:schemeClr val="tx1"/>
+            </a:fontRef>
+          </p:style>
+        </p:cxnSp>
+        <p:cxnSp>
+          <p:nvCxnSpPr>
+            <p:cNvPr id="29" name="直線矢印コネクタ 28">
+              <a:extLst>
+                <a:ext uri="{FF2B5EF4-FFF2-40B4-BE49-F238E27FC236}">
+                  <a16:creationId xmlns:a16="http://schemas.microsoft.com/office/drawing/2014/main" id="{56769FBF-D76E-99BA-AC88-3B241CB3A21C}"/>
+                </a:ext>
+              </a:extLst>
+            </p:cNvPr>
+            <p:cNvCxnSpPr>
+              <a:cxnSpLocks/>
+            </p:cNvCxnSpPr>
+            <p:nvPr/>
+          </p:nvCxnSpPr>
+          <p:spPr>
+            <a:xfrm flipH="1">
+              <a:off x="5799573" y="3827091"/>
+              <a:ext cx="561600" cy="324001"/>
+            </a:xfrm>
+            <a:prstGeom prst="straightConnector1">
+              <a:avLst/>
+            </a:prstGeom>
+            <a:ln w="38100">
+              <a:solidFill>
+                <a:srgbClr val="06466E"/>
+              </a:solidFill>
+              <a:tailEnd type="triangle"/>
+            </a:ln>
+          </p:spPr>
+          <p:style>
+            <a:lnRef idx="1">
+              <a:schemeClr val="accent1"/>
+            </a:lnRef>
+            <a:fillRef idx="0">
+              <a:schemeClr val="accent1"/>
+            </a:fillRef>
+            <a:effectRef idx="0">
+              <a:schemeClr val="accent1"/>
+            </a:effectRef>
+            <a:fontRef idx="minor">
+              <a:schemeClr val="tx1"/>
+            </a:fontRef>
+          </p:style>
+        </p:cxnSp>
+      </p:grpSp>
+      <p:grpSp>
+        <p:nvGrpSpPr>
+          <p:cNvPr id="30" name="グループ化 29">
+            <a:extLst>
+              <a:ext uri="{FF2B5EF4-FFF2-40B4-BE49-F238E27FC236}">
+                <a16:creationId xmlns:a16="http://schemas.microsoft.com/office/drawing/2014/main" id="{4E626C03-5CF4-7440-80AE-20C59596C4D4}"/>
+              </a:ext>
+            </a:extLst>
+          </p:cNvPr>
+          <p:cNvGrpSpPr/>
+          <p:nvPr/>
+        </p:nvGrpSpPr>
+        <p:grpSpPr>
+          <a:xfrm>
+            <a:off x="6339435" y="1196752"/>
+            <a:ext cx="2055320" cy="2370455"/>
+            <a:chOff x="5291123" y="3779867"/>
+            <a:chExt cx="1609754" cy="1856572"/>
+          </a:xfrm>
+        </p:grpSpPr>
+        <p:cxnSp>
+          <p:nvCxnSpPr>
+            <p:cNvPr id="31" name="直線矢印コネクタ 30">
+              <a:extLst>
+                <a:ext uri="{FF2B5EF4-FFF2-40B4-BE49-F238E27FC236}">
+                  <a16:creationId xmlns:a16="http://schemas.microsoft.com/office/drawing/2014/main" id="{FBEC7C68-DAFF-20BE-786B-4B17DF6939D6}"/>
+                </a:ext>
+              </a:extLst>
+            </p:cNvPr>
+            <p:cNvCxnSpPr>
+              <a:cxnSpLocks/>
+            </p:cNvCxnSpPr>
+            <p:nvPr/>
+          </p:nvCxnSpPr>
+          <p:spPr>
+            <a:xfrm>
+              <a:off x="6097214" y="3779867"/>
+              <a:ext cx="0" cy="348225"/>
+            </a:xfrm>
+            <a:prstGeom prst="straightConnector1">
+              <a:avLst/>
+            </a:prstGeom>
+            <a:ln w="38100">
+              <a:solidFill>
+                <a:srgbClr val="BB1109"/>
+              </a:solidFill>
+              <a:tailEnd type="triangle"/>
+            </a:ln>
+          </p:spPr>
+          <p:style>
+            <a:lnRef idx="1">
+              <a:schemeClr val="accent1"/>
+            </a:lnRef>
+            <a:fillRef idx="0">
+              <a:schemeClr val="accent1"/>
+            </a:fillRef>
+            <a:effectRef idx="0">
+              <a:schemeClr val="accent1"/>
+            </a:effectRef>
+            <a:fontRef idx="minor">
+              <a:schemeClr val="tx1"/>
+            </a:fontRef>
+          </p:style>
+        </p:cxnSp>
+        <p:cxnSp>
+          <p:nvCxnSpPr>
+            <p:cNvPr id="32" name="直線矢印コネクタ 31">
+              <a:extLst>
+                <a:ext uri="{FF2B5EF4-FFF2-40B4-BE49-F238E27FC236}">
+                  <a16:creationId xmlns:a16="http://schemas.microsoft.com/office/drawing/2014/main" id="{3CE33C4B-A890-3337-62C8-AC4840045237}"/>
+                </a:ext>
+              </a:extLst>
+            </p:cNvPr>
+            <p:cNvCxnSpPr>
+              <a:cxnSpLocks/>
+            </p:cNvCxnSpPr>
+            <p:nvPr/>
+          </p:nvCxnSpPr>
+          <p:spPr>
+            <a:xfrm>
+              <a:off x="6097214" y="5288214"/>
+              <a:ext cx="0" cy="348225"/>
+            </a:xfrm>
+            <a:prstGeom prst="straightConnector1">
+              <a:avLst/>
+            </a:prstGeom>
+            <a:ln w="38100">
+              <a:solidFill>
+                <a:srgbClr val="BB1109"/>
+              </a:solidFill>
+              <a:tailEnd type="triangle"/>
+            </a:ln>
+          </p:spPr>
+          <p:style>
+            <a:lnRef idx="1">
+              <a:schemeClr val="accent1"/>
+            </a:lnRef>
+            <a:fillRef idx="0">
+              <a:schemeClr val="accent1"/>
+            </a:fillRef>
+            <a:effectRef idx="0">
+              <a:schemeClr val="accent1"/>
+            </a:effectRef>
+            <a:fontRef idx="minor">
+              <a:schemeClr val="tx1"/>
+            </a:fontRef>
+          </p:style>
+        </p:cxnSp>
+        <p:cxnSp>
+          <p:nvCxnSpPr>
+            <p:cNvPr id="33" name="直線矢印コネクタ 32">
+              <a:extLst>
+                <a:ext uri="{FF2B5EF4-FFF2-40B4-BE49-F238E27FC236}">
+                  <a16:creationId xmlns:a16="http://schemas.microsoft.com/office/drawing/2014/main" id="{E80F096B-4934-E054-2449-0AC27CC99D35}"/>
+                </a:ext>
+              </a:extLst>
+            </p:cNvPr>
+            <p:cNvCxnSpPr>
+              <a:cxnSpLocks/>
+            </p:cNvCxnSpPr>
+            <p:nvPr/>
+          </p:nvCxnSpPr>
+          <p:spPr>
+            <a:xfrm flipH="1">
+              <a:off x="6598928" y="4243540"/>
+              <a:ext cx="301795" cy="174112"/>
+            </a:xfrm>
+            <a:prstGeom prst="straightConnector1">
+              <a:avLst/>
+            </a:prstGeom>
+            <a:ln w="38100">
+              <a:solidFill>
+                <a:srgbClr val="BB1109"/>
+              </a:solidFill>
+              <a:tailEnd type="triangle"/>
+            </a:ln>
+          </p:spPr>
+          <p:style>
+            <a:lnRef idx="1">
+              <a:schemeClr val="accent1"/>
+            </a:lnRef>
+            <a:fillRef idx="0">
+              <a:schemeClr val="accent1"/>
+            </a:fillRef>
+            <a:effectRef idx="0">
+              <a:schemeClr val="accent1"/>
+            </a:effectRef>
+            <a:fontRef idx="minor">
+              <a:schemeClr val="tx1"/>
+            </a:fontRef>
+          </p:style>
+        </p:cxnSp>
+        <p:cxnSp>
+          <p:nvCxnSpPr>
+            <p:cNvPr id="34" name="直線矢印コネクタ 33">
+              <a:extLst>
+                <a:ext uri="{FF2B5EF4-FFF2-40B4-BE49-F238E27FC236}">
+                  <a16:creationId xmlns:a16="http://schemas.microsoft.com/office/drawing/2014/main" id="{F32E93EA-C3A6-2E70-0951-BF362D645833}"/>
+                </a:ext>
+              </a:extLst>
+            </p:cNvPr>
+            <p:cNvCxnSpPr>
+              <a:cxnSpLocks/>
+            </p:cNvCxnSpPr>
+            <p:nvPr/>
+          </p:nvCxnSpPr>
+          <p:spPr>
+            <a:xfrm>
+              <a:off x="5291123" y="4243540"/>
+              <a:ext cx="301795" cy="174112"/>
+            </a:xfrm>
+            <a:prstGeom prst="straightConnector1">
+              <a:avLst/>
+            </a:prstGeom>
+            <a:ln w="38100">
+              <a:solidFill>
+                <a:srgbClr val="BB1109"/>
+              </a:solidFill>
+              <a:tailEnd type="triangle"/>
+            </a:ln>
+          </p:spPr>
+          <p:style>
+            <a:lnRef idx="1">
+              <a:schemeClr val="accent1"/>
+            </a:lnRef>
+            <a:fillRef idx="0">
+              <a:schemeClr val="accent1"/>
+            </a:fillRef>
+            <a:effectRef idx="0">
+              <a:schemeClr val="accent1"/>
+            </a:effectRef>
+            <a:fontRef idx="minor">
+              <a:schemeClr val="tx1"/>
+            </a:fontRef>
+          </p:style>
+        </p:cxnSp>
+        <p:cxnSp>
+          <p:nvCxnSpPr>
+            <p:cNvPr id="35" name="直線矢印コネクタ 34">
+              <a:extLst>
+                <a:ext uri="{FF2B5EF4-FFF2-40B4-BE49-F238E27FC236}">
+                  <a16:creationId xmlns:a16="http://schemas.microsoft.com/office/drawing/2014/main" id="{4BC6F4F1-CE01-DE83-F977-0368EB6C6EF5}"/>
+                </a:ext>
+              </a:extLst>
+            </p:cNvPr>
+            <p:cNvCxnSpPr>
+              <a:cxnSpLocks/>
+            </p:cNvCxnSpPr>
+            <p:nvPr/>
+          </p:nvCxnSpPr>
+          <p:spPr>
+            <a:xfrm flipH="1">
+              <a:off x="5295481" y="4998027"/>
+              <a:ext cx="301795" cy="174112"/>
+            </a:xfrm>
+            <a:prstGeom prst="straightConnector1">
+              <a:avLst/>
+            </a:prstGeom>
+            <a:ln w="38100">
+              <a:solidFill>
+                <a:srgbClr val="BB1109"/>
+              </a:solidFill>
+              <a:tailEnd type="triangle"/>
+            </a:ln>
+          </p:spPr>
+          <p:style>
+            <a:lnRef idx="1">
+              <a:schemeClr val="accent1"/>
+            </a:lnRef>
+            <a:fillRef idx="0">
+              <a:schemeClr val="accent1"/>
+            </a:fillRef>
+            <a:effectRef idx="0">
+              <a:schemeClr val="accent1"/>
+            </a:effectRef>
+            <a:fontRef idx="minor">
+              <a:schemeClr val="tx1"/>
+            </a:fontRef>
+          </p:style>
+        </p:cxnSp>
+        <p:cxnSp>
+          <p:nvCxnSpPr>
+            <p:cNvPr id="36" name="直線矢印コネクタ 35">
+              <a:extLst>
+                <a:ext uri="{FF2B5EF4-FFF2-40B4-BE49-F238E27FC236}">
+                  <a16:creationId xmlns:a16="http://schemas.microsoft.com/office/drawing/2014/main" id="{30C150CC-AB10-592F-ABC1-575B997FFB1C}"/>
+                </a:ext>
+              </a:extLst>
+            </p:cNvPr>
+            <p:cNvCxnSpPr>
+              <a:cxnSpLocks/>
+            </p:cNvCxnSpPr>
+            <p:nvPr/>
+          </p:nvCxnSpPr>
+          <p:spPr>
+            <a:xfrm>
+              <a:off x="6599082" y="4999031"/>
+              <a:ext cx="301795" cy="174112"/>
+            </a:xfrm>
+            <a:prstGeom prst="straightConnector1">
+              <a:avLst/>
+            </a:prstGeom>
+            <a:ln w="38100">
+              <a:solidFill>
+                <a:srgbClr val="BB1109"/>
+              </a:solidFill>
+              <a:tailEnd type="triangle"/>
+            </a:ln>
+          </p:spPr>
+          <p:style>
+            <a:lnRef idx="1">
+              <a:schemeClr val="accent1"/>
+            </a:lnRef>
+            <a:fillRef idx="0">
+              <a:schemeClr val="accent1"/>
+            </a:fillRef>
+            <a:effectRef idx="0">
+              <a:schemeClr val="accent1"/>
+            </a:effectRef>
+            <a:fontRef idx="minor">
+              <a:schemeClr val="tx1"/>
+            </a:fontRef>
+          </p:style>
+        </p:cxnSp>
+      </p:grpSp>
+      <p:grpSp>
+        <p:nvGrpSpPr>
+          <p:cNvPr id="19" name="グループ化 18">
+            <a:extLst>
+              <a:ext uri="{FF2B5EF4-FFF2-40B4-BE49-F238E27FC236}">
+                <a16:creationId xmlns:a16="http://schemas.microsoft.com/office/drawing/2014/main" id="{B1C681A6-9797-0736-0712-CA247CE445F8}"/>
+              </a:ext>
+            </a:extLst>
+          </p:cNvPr>
+          <p:cNvGrpSpPr/>
+          <p:nvPr/>
+        </p:nvGrpSpPr>
+        <p:grpSpPr>
+          <a:xfrm>
+            <a:off x="1055440" y="4869160"/>
+            <a:ext cx="772190" cy="890207"/>
+            <a:chOff x="5724741" y="3705189"/>
+            <a:chExt cx="1248420" cy="1439223"/>
+          </a:xfrm>
+        </p:grpSpPr>
+        <p:cxnSp>
+          <p:nvCxnSpPr>
+            <p:cNvPr id="37" name="直線矢印コネクタ 36">
+              <a:extLst>
+                <a:ext uri="{FF2B5EF4-FFF2-40B4-BE49-F238E27FC236}">
+                  <a16:creationId xmlns:a16="http://schemas.microsoft.com/office/drawing/2014/main" id="{00079476-72CB-876B-E239-1EF7B71B8A4A}"/>
+                </a:ext>
+              </a:extLst>
+            </p:cNvPr>
+            <p:cNvCxnSpPr>
+              <a:cxnSpLocks/>
+            </p:cNvCxnSpPr>
+            <p:nvPr/>
+          </p:nvCxnSpPr>
+          <p:spPr>
+            <a:xfrm>
+              <a:off x="6350361" y="3705189"/>
+              <a:ext cx="622800" cy="360000"/>
+            </a:xfrm>
+            <a:prstGeom prst="straightConnector1">
+              <a:avLst/>
+            </a:prstGeom>
+            <a:ln w="57150">
+              <a:solidFill>
+                <a:srgbClr val="06466E"/>
+              </a:solidFill>
+              <a:tailEnd type="triangle"/>
+            </a:ln>
+          </p:spPr>
+          <p:style>
+            <a:lnRef idx="1">
+              <a:schemeClr val="accent1"/>
+            </a:lnRef>
+            <a:fillRef idx="0">
+              <a:schemeClr val="accent1"/>
+            </a:fillRef>
+            <a:effectRef idx="0">
+              <a:schemeClr val="accent1"/>
+            </a:effectRef>
+            <a:fontRef idx="minor">
+              <a:schemeClr val="tx1"/>
+            </a:fontRef>
+          </p:style>
+        </p:cxnSp>
+        <p:cxnSp>
+          <p:nvCxnSpPr>
+            <p:cNvPr id="38" name="直線矢印コネクタ 37">
+              <a:extLst>
+                <a:ext uri="{FF2B5EF4-FFF2-40B4-BE49-F238E27FC236}">
+                  <a16:creationId xmlns:a16="http://schemas.microsoft.com/office/drawing/2014/main" id="{CB331D19-26D9-D123-B07A-99DBDD051062}"/>
+                </a:ext>
+              </a:extLst>
+            </p:cNvPr>
+            <p:cNvCxnSpPr>
+              <a:cxnSpLocks/>
+            </p:cNvCxnSpPr>
+            <p:nvPr/>
+          </p:nvCxnSpPr>
+          <p:spPr>
+            <a:xfrm>
+              <a:off x="6972968" y="4064412"/>
+              <a:ext cx="0" cy="720000"/>
+            </a:xfrm>
+            <a:prstGeom prst="straightConnector1">
+              <a:avLst/>
+            </a:prstGeom>
+            <a:ln w="57150">
+              <a:solidFill>
+                <a:srgbClr val="06466E"/>
+              </a:solidFill>
+              <a:tailEnd type="triangle"/>
+            </a:ln>
+          </p:spPr>
+          <p:style>
+            <a:lnRef idx="1">
+              <a:schemeClr val="accent1"/>
+            </a:lnRef>
+            <a:fillRef idx="0">
+              <a:schemeClr val="accent1"/>
+            </a:fillRef>
+            <a:effectRef idx="0">
+              <a:schemeClr val="accent1"/>
+            </a:effectRef>
+            <a:fontRef idx="minor">
+              <a:schemeClr val="tx1"/>
+            </a:fontRef>
+          </p:style>
+        </p:cxnSp>
+        <p:cxnSp>
+          <p:nvCxnSpPr>
+            <p:cNvPr id="39" name="直線矢印コネクタ 38">
+              <a:extLst>
+                <a:ext uri="{FF2B5EF4-FFF2-40B4-BE49-F238E27FC236}">
+                  <a16:creationId xmlns:a16="http://schemas.microsoft.com/office/drawing/2014/main" id="{25E6D3DF-5F8B-0C08-01CF-AC0C19279313}"/>
+                </a:ext>
+              </a:extLst>
+            </p:cNvPr>
+            <p:cNvCxnSpPr>
+              <a:cxnSpLocks/>
+            </p:cNvCxnSpPr>
+            <p:nvPr/>
+          </p:nvCxnSpPr>
+          <p:spPr>
+            <a:xfrm flipH="1">
+              <a:off x="6350361" y="4784412"/>
+              <a:ext cx="622800" cy="360000"/>
+            </a:xfrm>
+            <a:prstGeom prst="straightConnector1">
+              <a:avLst/>
+            </a:prstGeom>
+            <a:ln w="57150">
+              <a:solidFill>
+                <a:srgbClr val="06466E"/>
+              </a:solidFill>
+              <a:tailEnd type="triangle"/>
+            </a:ln>
+          </p:spPr>
+          <p:style>
+            <a:lnRef idx="1">
+              <a:schemeClr val="accent1"/>
+            </a:lnRef>
+            <a:fillRef idx="0">
+              <a:schemeClr val="accent1"/>
+            </a:fillRef>
+            <a:effectRef idx="0">
+              <a:schemeClr val="accent1"/>
+            </a:effectRef>
+            <a:fontRef idx="minor">
+              <a:schemeClr val="tx1"/>
+            </a:fontRef>
+          </p:style>
+        </p:cxnSp>
+        <p:cxnSp>
+          <p:nvCxnSpPr>
+            <p:cNvPr id="40" name="直線矢印コネクタ 39">
+              <a:extLst>
+                <a:ext uri="{FF2B5EF4-FFF2-40B4-BE49-F238E27FC236}">
+                  <a16:creationId xmlns:a16="http://schemas.microsoft.com/office/drawing/2014/main" id="{2D0DD368-3F9E-7310-A696-D320F4D17B91}"/>
+                </a:ext>
+              </a:extLst>
+            </p:cNvPr>
+            <p:cNvCxnSpPr>
+              <a:cxnSpLocks/>
+            </p:cNvCxnSpPr>
+            <p:nvPr/>
+          </p:nvCxnSpPr>
+          <p:spPr>
+            <a:xfrm flipH="1" flipV="1">
+              <a:off x="5727561" y="4784412"/>
+              <a:ext cx="622800" cy="360000"/>
+            </a:xfrm>
+            <a:prstGeom prst="straightConnector1">
+              <a:avLst/>
+            </a:prstGeom>
+            <a:ln w="57150">
+              <a:solidFill>
+                <a:srgbClr val="06466E"/>
+              </a:solidFill>
+              <a:tailEnd type="triangle"/>
+            </a:ln>
+          </p:spPr>
+          <p:style>
+            <a:lnRef idx="1">
+              <a:schemeClr val="accent1"/>
+            </a:lnRef>
+            <a:fillRef idx="0">
+              <a:schemeClr val="accent1"/>
+            </a:fillRef>
+            <a:effectRef idx="0">
+              <a:schemeClr val="accent1"/>
+            </a:effectRef>
+            <a:fontRef idx="minor">
+              <a:schemeClr val="tx1"/>
+            </a:fontRef>
+          </p:style>
+        </p:cxnSp>
+        <p:cxnSp>
+          <p:nvCxnSpPr>
+            <p:cNvPr id="41" name="直線矢印コネクタ 40">
+              <a:extLst>
+                <a:ext uri="{FF2B5EF4-FFF2-40B4-BE49-F238E27FC236}">
+                  <a16:creationId xmlns:a16="http://schemas.microsoft.com/office/drawing/2014/main" id="{A5173BFE-7C2B-D1A4-19CD-64C2A4316D2B}"/>
+                </a:ext>
+              </a:extLst>
+            </p:cNvPr>
+            <p:cNvCxnSpPr>
+              <a:cxnSpLocks/>
+            </p:cNvCxnSpPr>
+            <p:nvPr/>
+          </p:nvCxnSpPr>
+          <p:spPr>
+            <a:xfrm flipV="1">
+              <a:off x="5724741" y="4064412"/>
+              <a:ext cx="0" cy="720000"/>
+            </a:xfrm>
+            <a:prstGeom prst="straightConnector1">
+              <a:avLst/>
+            </a:prstGeom>
+            <a:ln w="57150">
+              <a:solidFill>
+                <a:srgbClr val="06466E"/>
+              </a:solidFill>
+              <a:tailEnd type="triangle"/>
+            </a:ln>
+          </p:spPr>
+          <p:style>
+            <a:lnRef idx="1">
+              <a:schemeClr val="accent1"/>
+            </a:lnRef>
+            <a:fillRef idx="0">
+              <a:schemeClr val="accent1"/>
+            </a:fillRef>
+            <a:effectRef idx="0">
+              <a:schemeClr val="accent1"/>
+            </a:effectRef>
+            <a:fontRef idx="minor">
+              <a:schemeClr val="tx1"/>
+            </a:fontRef>
+          </p:style>
+        </p:cxnSp>
+        <p:cxnSp>
+          <p:nvCxnSpPr>
+            <p:cNvPr id="42" name="直線矢印コネクタ 41">
+              <a:extLst>
+                <a:ext uri="{FF2B5EF4-FFF2-40B4-BE49-F238E27FC236}">
+                  <a16:creationId xmlns:a16="http://schemas.microsoft.com/office/drawing/2014/main" id="{5B1C92A0-3CA8-6316-53EB-FE5FD0C4A684}"/>
+                </a:ext>
+              </a:extLst>
+            </p:cNvPr>
+            <p:cNvCxnSpPr>
+              <a:cxnSpLocks/>
+            </p:cNvCxnSpPr>
+            <p:nvPr/>
+          </p:nvCxnSpPr>
+          <p:spPr>
+            <a:xfrm flipV="1">
+              <a:off x="5727561" y="3705189"/>
+              <a:ext cx="622800" cy="360000"/>
+            </a:xfrm>
+            <a:prstGeom prst="straightConnector1">
+              <a:avLst/>
+            </a:prstGeom>
+            <a:ln w="57150">
+              <a:solidFill>
+                <a:srgbClr val="06466E"/>
+              </a:solidFill>
+              <a:tailEnd type="triangle"/>
+            </a:ln>
+          </p:spPr>
+          <p:style>
+            <a:lnRef idx="1">
+              <a:schemeClr val="accent1"/>
+            </a:lnRef>
+            <a:fillRef idx="0">
+              <a:schemeClr val="accent1"/>
+            </a:fillRef>
+            <a:effectRef idx="0">
+              <a:schemeClr val="accent1"/>
+            </a:effectRef>
+            <a:fontRef idx="minor">
+              <a:schemeClr val="tx1"/>
+            </a:fontRef>
+          </p:style>
+        </p:cxnSp>
+        <p:cxnSp>
+          <p:nvCxnSpPr>
+            <p:cNvPr id="43" name="直線矢印コネクタ 42">
+              <a:extLst>
+                <a:ext uri="{FF2B5EF4-FFF2-40B4-BE49-F238E27FC236}">
+                  <a16:creationId xmlns:a16="http://schemas.microsoft.com/office/drawing/2014/main" id="{2983B72A-EF5E-7FAC-D97C-FBC3F337A066}"/>
+                </a:ext>
+              </a:extLst>
+            </p:cNvPr>
+            <p:cNvCxnSpPr>
+              <a:cxnSpLocks/>
+            </p:cNvCxnSpPr>
+            <p:nvPr/>
+          </p:nvCxnSpPr>
+          <p:spPr>
+            <a:xfrm flipV="1">
+              <a:off x="6838646" y="4064412"/>
+              <a:ext cx="0" cy="647999"/>
+            </a:xfrm>
+            <a:prstGeom prst="straightConnector1">
+              <a:avLst/>
+            </a:prstGeom>
+            <a:ln w="57150">
+              <a:solidFill>
+                <a:srgbClr val="06466E"/>
+              </a:solidFill>
+              <a:tailEnd type="triangle"/>
+            </a:ln>
+          </p:spPr>
+          <p:style>
+            <a:lnRef idx="1">
+              <a:schemeClr val="accent1"/>
+            </a:lnRef>
+            <a:fillRef idx="0">
+              <a:schemeClr val="accent1"/>
+            </a:fillRef>
+            <a:effectRef idx="0">
+              <a:schemeClr val="accent1"/>
+            </a:effectRef>
+            <a:fontRef idx="minor">
+              <a:schemeClr val="tx1"/>
+            </a:fontRef>
+          </p:style>
+        </p:cxnSp>
+        <p:cxnSp>
+          <p:nvCxnSpPr>
+            <p:cNvPr id="44" name="直線矢印コネクタ 43">
+              <a:extLst>
+                <a:ext uri="{FF2B5EF4-FFF2-40B4-BE49-F238E27FC236}">
+                  <a16:creationId xmlns:a16="http://schemas.microsoft.com/office/drawing/2014/main" id="{688EBC9F-09A9-CFE5-23E1-FDCFAAE56818}"/>
+                </a:ext>
+              </a:extLst>
+            </p:cNvPr>
+            <p:cNvCxnSpPr>
+              <a:cxnSpLocks/>
+            </p:cNvCxnSpPr>
+            <p:nvPr/>
+          </p:nvCxnSpPr>
+          <p:spPr>
+            <a:xfrm>
+              <a:off x="5876883" y="4698510"/>
+              <a:ext cx="561601" cy="324000"/>
+            </a:xfrm>
+            <a:prstGeom prst="straightConnector1">
+              <a:avLst/>
+            </a:prstGeom>
+            <a:ln w="57150">
+              <a:solidFill>
+                <a:srgbClr val="06466E"/>
+              </a:solidFill>
+              <a:tailEnd type="triangle"/>
+            </a:ln>
+          </p:spPr>
+          <p:style>
+            <a:lnRef idx="1">
+              <a:schemeClr val="accent1"/>
+            </a:lnRef>
+            <a:fillRef idx="0">
+              <a:schemeClr val="accent1"/>
+            </a:fillRef>
+            <a:effectRef idx="0">
+              <a:schemeClr val="accent1"/>
+            </a:effectRef>
+            <a:fontRef idx="minor">
+              <a:schemeClr val="tx1"/>
+            </a:fontRef>
+          </p:style>
+        </p:cxnSp>
+        <p:cxnSp>
+          <p:nvCxnSpPr>
+            <p:cNvPr id="45" name="直線矢印コネクタ 44">
+              <a:extLst>
+                <a:ext uri="{FF2B5EF4-FFF2-40B4-BE49-F238E27FC236}">
+                  <a16:creationId xmlns:a16="http://schemas.microsoft.com/office/drawing/2014/main" id="{EE24113C-C194-95CF-BB71-2DDA245D905F}"/>
+                </a:ext>
+              </a:extLst>
+            </p:cNvPr>
+            <p:cNvCxnSpPr>
+              <a:cxnSpLocks/>
+            </p:cNvCxnSpPr>
+            <p:nvPr/>
+          </p:nvCxnSpPr>
+          <p:spPr>
+            <a:xfrm flipH="1">
+              <a:off x="5827967" y="3852898"/>
+              <a:ext cx="561601" cy="324000"/>
+            </a:xfrm>
+            <a:prstGeom prst="straightConnector1">
+              <a:avLst/>
+            </a:prstGeom>
+            <a:ln w="57150">
+              <a:solidFill>
+                <a:srgbClr val="06466E"/>
+              </a:solidFill>
+              <a:tailEnd type="triangle"/>
+            </a:ln>
+          </p:spPr>
+          <p:style>
+            <a:lnRef idx="1">
+              <a:schemeClr val="accent1"/>
+            </a:lnRef>
+            <a:fillRef idx="0">
+              <a:schemeClr val="accent1"/>
+            </a:fillRef>
+            <a:effectRef idx="0">
+              <a:schemeClr val="accent1"/>
+            </a:effectRef>
+            <a:fontRef idx="minor">
+              <a:schemeClr val="tx1"/>
+            </a:fontRef>
+          </p:style>
+        </p:cxnSp>
+      </p:grpSp>
+      <p:grpSp>
+        <p:nvGrpSpPr>
+          <p:cNvPr id="46" name="グループ化 45">
+            <a:extLst>
+              <a:ext uri="{FF2B5EF4-FFF2-40B4-BE49-F238E27FC236}">
+                <a16:creationId xmlns:a16="http://schemas.microsoft.com/office/drawing/2014/main" id="{2B35389D-4C4A-14AD-25F1-98A852D19DFE}"/>
+              </a:ext>
+            </a:extLst>
+          </p:cNvPr>
+          <p:cNvGrpSpPr/>
+          <p:nvPr/>
+        </p:nvGrpSpPr>
+        <p:grpSpPr>
+          <a:xfrm>
+            <a:off x="747512" y="4513827"/>
+            <a:ext cx="1388048" cy="1600872"/>
+            <a:chOff x="5291123" y="3779867"/>
+            <a:chExt cx="1609754" cy="1856572"/>
+          </a:xfrm>
+        </p:grpSpPr>
+        <p:cxnSp>
+          <p:nvCxnSpPr>
+            <p:cNvPr id="47" name="直線矢印コネクタ 46">
+              <a:extLst>
+                <a:ext uri="{FF2B5EF4-FFF2-40B4-BE49-F238E27FC236}">
+                  <a16:creationId xmlns:a16="http://schemas.microsoft.com/office/drawing/2014/main" id="{8FB2A161-FEF0-E532-118F-15B777D3A67C}"/>
+                </a:ext>
+              </a:extLst>
+            </p:cNvPr>
+            <p:cNvCxnSpPr>
+              <a:cxnSpLocks/>
+            </p:cNvCxnSpPr>
+            <p:nvPr/>
+          </p:nvCxnSpPr>
+          <p:spPr>
+            <a:xfrm>
+              <a:off x="6097214" y="3779867"/>
+              <a:ext cx="0" cy="348225"/>
+            </a:xfrm>
+            <a:prstGeom prst="straightConnector1">
+              <a:avLst/>
+            </a:prstGeom>
+            <a:ln w="57150">
+              <a:solidFill>
+                <a:srgbClr val="BB1109"/>
+              </a:solidFill>
+              <a:tailEnd type="triangle"/>
+            </a:ln>
+          </p:spPr>
+          <p:style>
+            <a:lnRef idx="1">
+              <a:schemeClr val="accent1"/>
+            </a:lnRef>
+            <a:fillRef idx="0">
+              <a:schemeClr val="accent1"/>
+            </a:fillRef>
+            <a:effectRef idx="0">
+              <a:schemeClr val="accent1"/>
+            </a:effectRef>
+            <a:fontRef idx="minor">
+              <a:schemeClr val="tx1"/>
+            </a:fontRef>
+          </p:style>
+        </p:cxnSp>
+        <p:cxnSp>
+          <p:nvCxnSpPr>
+            <p:cNvPr id="48" name="直線矢印コネクタ 47">
+              <a:extLst>
+                <a:ext uri="{FF2B5EF4-FFF2-40B4-BE49-F238E27FC236}">
+                  <a16:creationId xmlns:a16="http://schemas.microsoft.com/office/drawing/2014/main" id="{C609F0A6-DDC6-37B2-20EA-D94ABAFE10B9}"/>
+                </a:ext>
+              </a:extLst>
+            </p:cNvPr>
+            <p:cNvCxnSpPr>
+              <a:cxnSpLocks/>
+            </p:cNvCxnSpPr>
+            <p:nvPr/>
+          </p:nvCxnSpPr>
+          <p:spPr>
+            <a:xfrm>
+              <a:off x="6097214" y="5288214"/>
+              <a:ext cx="0" cy="348225"/>
+            </a:xfrm>
+            <a:prstGeom prst="straightConnector1">
+              <a:avLst/>
+            </a:prstGeom>
+            <a:ln w="57150">
+              <a:solidFill>
+                <a:srgbClr val="BB1109"/>
+              </a:solidFill>
+              <a:tailEnd type="triangle"/>
+            </a:ln>
+          </p:spPr>
+          <p:style>
+            <a:lnRef idx="1">
+              <a:schemeClr val="accent1"/>
+            </a:lnRef>
+            <a:fillRef idx="0">
+              <a:schemeClr val="accent1"/>
+            </a:fillRef>
+            <a:effectRef idx="0">
+              <a:schemeClr val="accent1"/>
+            </a:effectRef>
+            <a:fontRef idx="minor">
+              <a:schemeClr val="tx1"/>
+            </a:fontRef>
+          </p:style>
+        </p:cxnSp>
+        <p:cxnSp>
+          <p:nvCxnSpPr>
+            <p:cNvPr id="49" name="直線矢印コネクタ 48">
+              <a:extLst>
+                <a:ext uri="{FF2B5EF4-FFF2-40B4-BE49-F238E27FC236}">
+                  <a16:creationId xmlns:a16="http://schemas.microsoft.com/office/drawing/2014/main" id="{DEC5E858-F100-85E3-1554-3D2744C8D068}"/>
+                </a:ext>
+              </a:extLst>
+            </p:cNvPr>
+            <p:cNvCxnSpPr>
+              <a:cxnSpLocks/>
+            </p:cNvCxnSpPr>
+            <p:nvPr/>
+          </p:nvCxnSpPr>
+          <p:spPr>
+            <a:xfrm flipH="1">
+              <a:off x="6598928" y="4243540"/>
+              <a:ext cx="301795" cy="174112"/>
+            </a:xfrm>
+            <a:prstGeom prst="straightConnector1">
+              <a:avLst/>
+            </a:prstGeom>
+            <a:ln w="57150">
+              <a:solidFill>
+                <a:srgbClr val="BB1109"/>
+              </a:solidFill>
+              <a:tailEnd type="triangle"/>
+            </a:ln>
+          </p:spPr>
+          <p:style>
+            <a:lnRef idx="1">
+              <a:schemeClr val="accent1"/>
+            </a:lnRef>
+            <a:fillRef idx="0">
+              <a:schemeClr val="accent1"/>
+            </a:fillRef>
+            <a:effectRef idx="0">
+              <a:schemeClr val="accent1"/>
+            </a:effectRef>
+            <a:fontRef idx="minor">
+              <a:schemeClr val="tx1"/>
+            </a:fontRef>
+          </p:style>
+        </p:cxnSp>
+        <p:cxnSp>
+          <p:nvCxnSpPr>
+            <p:cNvPr id="50" name="直線矢印コネクタ 49">
+              <a:extLst>
+                <a:ext uri="{FF2B5EF4-FFF2-40B4-BE49-F238E27FC236}">
+                  <a16:creationId xmlns:a16="http://schemas.microsoft.com/office/drawing/2014/main" id="{4CB64C0F-16F1-0FC2-6FFF-62D22604AFD8}"/>
+                </a:ext>
+              </a:extLst>
+            </p:cNvPr>
+            <p:cNvCxnSpPr>
+              <a:cxnSpLocks/>
+            </p:cNvCxnSpPr>
+            <p:nvPr/>
+          </p:nvCxnSpPr>
+          <p:spPr>
+            <a:xfrm>
+              <a:off x="5291123" y="4243540"/>
+              <a:ext cx="301795" cy="174112"/>
+            </a:xfrm>
+            <a:prstGeom prst="straightConnector1">
+              <a:avLst/>
+            </a:prstGeom>
+            <a:ln w="57150">
+              <a:solidFill>
+                <a:srgbClr val="BB1109"/>
+              </a:solidFill>
+              <a:tailEnd type="triangle"/>
+            </a:ln>
+          </p:spPr>
+          <p:style>
+            <a:lnRef idx="1">
+              <a:schemeClr val="accent1"/>
+            </a:lnRef>
+            <a:fillRef idx="0">
+              <a:schemeClr val="accent1"/>
+            </a:fillRef>
+            <a:effectRef idx="0">
+              <a:schemeClr val="accent1"/>
+            </a:effectRef>
+            <a:fontRef idx="minor">
+              <a:schemeClr val="tx1"/>
+            </a:fontRef>
+          </p:style>
+        </p:cxnSp>
+        <p:cxnSp>
+          <p:nvCxnSpPr>
+            <p:cNvPr id="51" name="直線矢印コネクタ 50">
+              <a:extLst>
+                <a:ext uri="{FF2B5EF4-FFF2-40B4-BE49-F238E27FC236}">
+                  <a16:creationId xmlns:a16="http://schemas.microsoft.com/office/drawing/2014/main" id="{EAF8B2F6-2E48-C773-F91A-D8C0DC9B8A08}"/>
+                </a:ext>
+              </a:extLst>
+            </p:cNvPr>
+            <p:cNvCxnSpPr>
+              <a:cxnSpLocks/>
+            </p:cNvCxnSpPr>
+            <p:nvPr/>
+          </p:nvCxnSpPr>
+          <p:spPr>
+            <a:xfrm flipH="1">
+              <a:off x="5295481" y="4998027"/>
+              <a:ext cx="301795" cy="174112"/>
+            </a:xfrm>
+            <a:prstGeom prst="straightConnector1">
+              <a:avLst/>
+            </a:prstGeom>
+            <a:ln w="57150">
+              <a:solidFill>
+                <a:srgbClr val="BB1109"/>
+              </a:solidFill>
+              <a:tailEnd type="triangle"/>
+            </a:ln>
+          </p:spPr>
+          <p:style>
+            <a:lnRef idx="1">
+              <a:schemeClr val="accent1"/>
+            </a:lnRef>
+            <a:fillRef idx="0">
+              <a:schemeClr val="accent1"/>
+            </a:fillRef>
+            <a:effectRef idx="0">
+              <a:schemeClr val="accent1"/>
+            </a:effectRef>
+            <a:fontRef idx="minor">
+              <a:schemeClr val="tx1"/>
+            </a:fontRef>
+          </p:style>
+        </p:cxnSp>
+        <p:cxnSp>
+          <p:nvCxnSpPr>
+            <p:cNvPr id="52" name="直線矢印コネクタ 51">
+              <a:extLst>
+                <a:ext uri="{FF2B5EF4-FFF2-40B4-BE49-F238E27FC236}">
+                  <a16:creationId xmlns:a16="http://schemas.microsoft.com/office/drawing/2014/main" id="{8D3EA6EC-06D8-840A-F6F6-18EBC30D4442}"/>
+                </a:ext>
+              </a:extLst>
+            </p:cNvPr>
+            <p:cNvCxnSpPr>
+              <a:cxnSpLocks/>
+            </p:cNvCxnSpPr>
+            <p:nvPr/>
+          </p:nvCxnSpPr>
+          <p:spPr>
+            <a:xfrm>
+              <a:off x="6599082" y="4999031"/>
+              <a:ext cx="301795" cy="174112"/>
+            </a:xfrm>
+            <a:prstGeom prst="straightConnector1">
+              <a:avLst/>
+            </a:prstGeom>
+            <a:ln w="57150">
+              <a:solidFill>
+                <a:srgbClr val="BB1109"/>
+              </a:solidFill>
+              <a:tailEnd type="triangle"/>
+            </a:ln>
+          </p:spPr>
+          <p:style>
+            <a:lnRef idx="1">
+              <a:schemeClr val="accent1"/>
+            </a:lnRef>
+            <a:fillRef idx="0">
+              <a:schemeClr val="accent1"/>
+            </a:fillRef>
+            <a:effectRef idx="0">
+              <a:schemeClr val="accent1"/>
+            </a:effectRef>
+            <a:fontRef idx="minor">
+              <a:schemeClr val="tx1"/>
+            </a:fontRef>
+          </p:style>
+        </p:cxnSp>
       </p:grpSp>
     </p:spTree>
     <p:extLst>

</xml_diff>